<commit_message>
updated PowerPoint pres for DIDC
</commit_message>
<xml_diff>
--- a/presentation/DIDCtalk.pptx
+++ b/presentation/DIDCtalk.pptx
@@ -11,11 +11,12 @@
     <p:sldId id="260" r:id="rId5"/>
     <p:sldId id="263" r:id="rId6"/>
     <p:sldId id="261" r:id="rId7"/>
-    <p:sldId id="262" r:id="rId8"/>
-    <p:sldId id="266" r:id="rId9"/>
-    <p:sldId id="268" r:id="rId10"/>
-    <p:sldId id="264" r:id="rId11"/>
-    <p:sldId id="265" r:id="rId12"/>
+    <p:sldId id="269" r:id="rId8"/>
+    <p:sldId id="262" r:id="rId9"/>
+    <p:sldId id="266" r:id="rId10"/>
+    <p:sldId id="268" r:id="rId11"/>
+    <p:sldId id="264" r:id="rId12"/>
+    <p:sldId id="265" r:id="rId13"/>
   </p:sldIdLst>
   <p:sldSz cx="9144000" cy="6858000" type="screen4x3"/>
   <p:notesSz cx="6858000" cy="9144000"/>
@@ -120,11 +121,6 @@
 <file path=ppt/slideLayouts/slideLayout1.xml><?xml version="1.0" encoding="utf-8"?>
 <p:sldLayout xmlns:a="http://schemas.openxmlformats.org/drawingml/2006/main" xmlns:r="http://schemas.openxmlformats.org/officeDocument/2006/relationships" xmlns:mc="http://schemas.openxmlformats.org/markup-compatibility/2006" xmlns:mv="urn:schemas-microsoft-com:mac:vml" xmlns:p="http://schemas.openxmlformats.org/presentationml/2006/main" mc:Ignorable="mv" mc:PreserveAttributes="mv:*" showMasterSp="0" type="title" preserve="1">
   <p:cSld name="Title Slide">
-    <p:bg>
-      <p:bgRef idx="1001">
-        <a:schemeClr val="bg2"/>
-      </p:bgRef>
-    </p:bg>
     <p:spTree>
       <p:nvGrpSpPr>
         <p:cNvPr id="1" name=""/>
@@ -398,7 +394,7 @@
             <a:fld id="{60898443-31E4-4A4A-8DA3-E3B90A134AB7}" type="datetimeFigureOut">
               <a:rPr lang="en-US" smtClean="0"/>
               <a:pPr/>
-              <a:t>2/26/15</a:t>
+              <a:t>3/1/15</a:t>
             </a:fld>
             <a:endParaRPr lang="en-US"/>
           </a:p>
@@ -673,7 +669,7 @@
     </p:spTree>
   </p:cSld>
   <p:clrMapOvr>
-    <a:overrideClrMapping bg1="lt1" tx1="dk1" bg2="lt2" tx2="dk2" accent1="accent1" accent2="accent2" accent3="accent3" accent4="accent4" accent5="accent5" accent6="accent6" hlink="hlink" folHlink="folHlink"/>
+    <a:masterClrMapping/>
   </p:clrMapOvr>
 </p:sldLayout>
 </file>
@@ -681,11 +677,6 @@
 <file path=ppt/slideLayouts/slideLayout10.xml><?xml version="1.0" encoding="utf-8"?>
 <p:sldLayout xmlns:a="http://schemas.openxmlformats.org/drawingml/2006/main" xmlns:r="http://schemas.openxmlformats.org/officeDocument/2006/relationships" xmlns:mc="http://schemas.openxmlformats.org/markup-compatibility/2006" xmlns:mv="urn:schemas-microsoft-com:mac:vml" xmlns:p="http://schemas.openxmlformats.org/presentationml/2006/main" mc:Ignorable="mv" mc:PreserveAttributes="mv:*" type="vertTx" preserve="1">
   <p:cSld name="Title and Vertical Text">
-    <p:bg>
-      <p:bgRef idx="1001">
-        <a:schemeClr val="bg2"/>
-      </p:bgRef>
-    </p:bg>
     <p:spTree>
       <p:nvGrpSpPr>
         <p:cNvPr id="1" name=""/>
@@ -793,7 +784,7 @@
             <a:fld id="{60898443-31E4-4A4A-8DA3-E3B90A134AB7}" type="datetimeFigureOut">
               <a:rPr lang="en-US" smtClean="0"/>
               <a:pPr/>
-              <a:t>2/26/15</a:t>
+              <a:t>3/1/15</a:t>
             </a:fld>
             <a:endParaRPr lang="en-US"/>
           </a:p>
@@ -845,7 +836,7 @@
     </p:spTree>
   </p:cSld>
   <p:clrMapOvr>
-    <a:overrideClrMapping bg1="lt1" tx1="dk1" bg2="lt2" tx2="dk2" accent1="accent1" accent2="accent2" accent3="accent3" accent4="accent4" accent5="accent5" accent6="accent6" hlink="hlink" folHlink="folHlink"/>
+    <a:masterClrMapping/>
   </p:clrMapOvr>
 </p:sldLayout>
 </file>
@@ -853,11 +844,6 @@
 <file path=ppt/slideLayouts/slideLayout11.xml><?xml version="1.0" encoding="utf-8"?>
 <p:sldLayout xmlns:a="http://schemas.openxmlformats.org/drawingml/2006/main" xmlns:r="http://schemas.openxmlformats.org/officeDocument/2006/relationships" xmlns:mc="http://schemas.openxmlformats.org/markup-compatibility/2006" xmlns:mv="urn:schemas-microsoft-com:mac:vml" xmlns:p="http://schemas.openxmlformats.org/presentationml/2006/main" mc:Ignorable="mv" mc:PreserveAttributes="mv:*" showMasterSp="0" type="vertTitleAndTx" preserve="1">
   <p:cSld name="Vertical Title and Text">
-    <p:bg>
-      <p:bgRef idx="1001">
-        <a:schemeClr val="bg2"/>
-      </p:bgRef>
-    </p:bg>
     <p:spTree>
       <p:nvGrpSpPr>
         <p:cNvPr id="1" name=""/>
@@ -1328,7 +1314,7 @@
             <a:fld id="{60898443-31E4-4A4A-8DA3-E3B90A134AB7}" type="datetimeFigureOut">
               <a:rPr lang="en-US" smtClean="0"/>
               <a:pPr/>
-              <a:t>2/26/15</a:t>
+              <a:t>3/1/15</a:t>
             </a:fld>
             <a:endParaRPr lang="en-US"/>
           </a:p>
@@ -1384,7 +1370,7 @@
     </p:spTree>
   </p:cSld>
   <p:clrMapOvr>
-    <a:overrideClrMapping bg1="lt1" tx1="dk1" bg2="lt2" tx2="dk2" accent1="accent1" accent2="accent2" accent3="accent3" accent4="accent4" accent5="accent5" accent6="accent6" hlink="hlink" folHlink="folHlink"/>
+    <a:masterClrMapping/>
   </p:clrMapOvr>
 </p:sldLayout>
 </file>
@@ -1392,11 +1378,6 @@
 <file path=ppt/slideLayouts/slideLayout2.xml><?xml version="1.0" encoding="utf-8"?>
 <p:sldLayout xmlns:a="http://schemas.openxmlformats.org/drawingml/2006/main" xmlns:r="http://schemas.openxmlformats.org/officeDocument/2006/relationships" xmlns:mc="http://schemas.openxmlformats.org/markup-compatibility/2006" xmlns:mv="urn:schemas-microsoft-com:mac:vml" xmlns:p="http://schemas.openxmlformats.org/presentationml/2006/main" mc:Ignorable="mv" mc:PreserveAttributes="mv:*" type="obj" preserve="1">
   <p:cSld name="Title and Content">
-    <p:bg>
-      <p:bgRef idx="1001">
-        <a:schemeClr val="bg2"/>
-      </p:bgRef>
-    </p:bg>
     <p:spTree>
       <p:nvGrpSpPr>
         <p:cNvPr id="1" name=""/>
@@ -1462,7 +1443,7 @@
             <a:fld id="{60898443-31E4-4A4A-8DA3-E3B90A134AB7}" type="datetimeFigureOut">
               <a:rPr lang="en-US" smtClean="0"/>
               <a:pPr/>
-              <a:t>2/26/15</a:t>
+              <a:t>3/1/15</a:t>
             </a:fld>
             <a:endParaRPr lang="en-US"/>
           </a:p>
@@ -1576,7 +1557,7 @@
     </p:spTree>
   </p:cSld>
   <p:clrMapOvr>
-    <a:overrideClrMapping bg1="lt1" tx1="dk1" bg2="lt2" tx2="dk2" accent1="accent1" accent2="accent2" accent3="accent3" accent4="accent4" accent5="accent5" accent6="accent6" hlink="hlink" folHlink="folHlink"/>
+    <a:masterClrMapping/>
   </p:clrMapOvr>
 </p:sldLayout>
 </file>
@@ -1584,11 +1565,6 @@
 <file path=ppt/slideLayouts/slideLayout3.xml><?xml version="1.0" encoding="utf-8"?>
 <p:sldLayout xmlns:a="http://schemas.openxmlformats.org/drawingml/2006/main" xmlns:r="http://schemas.openxmlformats.org/officeDocument/2006/relationships" xmlns:mc="http://schemas.openxmlformats.org/markup-compatibility/2006" xmlns:mv="urn:schemas-microsoft-com:mac:vml" xmlns:p="http://schemas.openxmlformats.org/presentationml/2006/main" mc:Ignorable="mv" mc:PreserveAttributes="mv:*" showMasterSp="0" type="secHead" preserve="1">
   <p:cSld name="Section Header">
-    <p:bg>
-      <p:bgRef idx="1001">
-        <a:schemeClr val="bg1"/>
-      </p:bgRef>
-    </p:bg>
     <p:spTree>
       <p:nvGrpSpPr>
         <p:cNvPr id="1" name=""/>
@@ -2007,7 +1983,7 @@
             <a:fld id="{60898443-31E4-4A4A-8DA3-E3B90A134AB7}" type="datetimeFigureOut">
               <a:rPr lang="en-US" smtClean="0"/>
               <a:pPr/>
-              <a:t>2/26/15</a:t>
+              <a:t>3/1/15</a:t>
             </a:fld>
             <a:endParaRPr lang="en-US"/>
           </a:p>
@@ -2226,7 +2202,7 @@
     </p:spTree>
   </p:cSld>
   <p:clrMapOvr>
-    <a:overrideClrMapping bg1="lt1" tx1="dk1" bg2="lt2" tx2="dk2" accent1="accent1" accent2="accent2" accent3="accent3" accent4="accent4" accent5="accent5" accent6="accent6" hlink="hlink" folHlink="folHlink"/>
+    <a:masterClrMapping/>
   </p:clrMapOvr>
 </p:sldLayout>
 </file>
@@ -2234,11 +2210,6 @@
 <file path=ppt/slideLayouts/slideLayout4.xml><?xml version="1.0" encoding="utf-8"?>
 <p:sldLayout xmlns:a="http://schemas.openxmlformats.org/drawingml/2006/main" xmlns:r="http://schemas.openxmlformats.org/officeDocument/2006/relationships" xmlns:mc="http://schemas.openxmlformats.org/markup-compatibility/2006" xmlns:mv="urn:schemas-microsoft-com:mac:vml" xmlns:p="http://schemas.openxmlformats.org/presentationml/2006/main" mc:Ignorable="mv" mc:PreserveAttributes="mv:*" type="twoObj" preserve="1">
   <p:cSld name="Two Content">
-    <p:bg>
-      <p:bgRef idx="1001">
-        <a:schemeClr val="bg2"/>
-      </p:bgRef>
-    </p:bg>
     <p:spTree>
       <p:nvGrpSpPr>
         <p:cNvPr id="1" name=""/>
@@ -2304,7 +2275,7 @@
             <a:fld id="{60898443-31E4-4A4A-8DA3-E3B90A134AB7}" type="datetimeFigureOut">
               <a:rPr lang="en-US" smtClean="0"/>
               <a:pPr/>
-              <a:t>2/26/15</a:t>
+              <a:t>3/1/15</a:t>
             </a:fld>
             <a:endParaRPr lang="en-US"/>
           </a:p>
@@ -2514,7 +2485,7 @@
     </p:spTree>
   </p:cSld>
   <p:clrMapOvr>
-    <a:overrideClrMapping bg1="lt1" tx1="dk1" bg2="lt2" tx2="dk2" accent1="accent1" accent2="accent2" accent3="accent3" accent4="accent4" accent5="accent5" accent6="accent6" hlink="hlink" folHlink="folHlink"/>
+    <a:masterClrMapping/>
   </p:clrMapOvr>
 </p:sldLayout>
 </file>
@@ -2522,11 +2493,6 @@
 <file path=ppt/slideLayouts/slideLayout5.xml><?xml version="1.0" encoding="utf-8"?>
 <p:sldLayout xmlns:a="http://schemas.openxmlformats.org/drawingml/2006/main" xmlns:r="http://schemas.openxmlformats.org/officeDocument/2006/relationships" xmlns:mc="http://schemas.openxmlformats.org/markup-compatibility/2006" xmlns:mv="urn:schemas-microsoft-com:mac:vml" xmlns:p="http://schemas.openxmlformats.org/presentationml/2006/main" mc:Ignorable="mv" mc:PreserveAttributes="mv:*" showMasterSp="0" type="twoTxTwoObj" preserve="1">
   <p:cSld name="Comparison">
-    <p:bg>
-      <p:bgRef idx="1001">
-        <a:schemeClr val="bg2"/>
-      </p:bgRef>
-    </p:bg>
     <p:spTree>
       <p:nvGrpSpPr>
         <p:cNvPr id="1" name=""/>
@@ -2965,7 +2931,7 @@
             <a:fld id="{60898443-31E4-4A4A-8DA3-E3B90A134AB7}" type="datetimeFigureOut">
               <a:rPr lang="en-US" smtClean="0"/>
               <a:pPr/>
-              <a:t>2/26/15</a:t>
+              <a:t>3/1/15</a:t>
             </a:fld>
             <a:endParaRPr lang="en-US"/>
           </a:p>
@@ -3340,7 +3306,7 @@
     </p:spTree>
   </p:cSld>
   <p:clrMapOvr>
-    <a:overrideClrMapping bg1="lt1" tx1="dk1" bg2="lt2" tx2="dk2" accent1="accent1" accent2="accent2" accent3="accent3" accent4="accent4" accent5="accent5" accent6="accent6" hlink="hlink" folHlink="folHlink"/>
+    <a:masterClrMapping/>
   </p:clrMapOvr>
 </p:sldLayout>
 </file>
@@ -3403,7 +3369,7 @@
             <a:fld id="{60898443-31E4-4A4A-8DA3-E3B90A134AB7}" type="datetimeFigureOut">
               <a:rPr lang="en-US" smtClean="0"/>
               <a:pPr/>
-              <a:t>2/26/15</a:t>
+              <a:t>3/1/15</a:t>
             </a:fld>
             <a:endParaRPr lang="en-US"/>
           </a:p>
@@ -3718,7 +3684,7 @@
             <a:fld id="{60898443-31E4-4A4A-8DA3-E3B90A134AB7}" type="datetimeFigureOut">
               <a:rPr lang="en-US" smtClean="0"/>
               <a:pPr/>
-              <a:t>2/26/15</a:t>
+              <a:t>3/1/15</a:t>
             </a:fld>
             <a:endParaRPr lang="en-US"/>
           </a:p>
@@ -3791,11 +3757,6 @@
 <file path=ppt/slideLayouts/slideLayout8.xml><?xml version="1.0" encoding="utf-8"?>
 <p:sldLayout xmlns:a="http://schemas.openxmlformats.org/drawingml/2006/main" xmlns:r="http://schemas.openxmlformats.org/officeDocument/2006/relationships" xmlns:mc="http://schemas.openxmlformats.org/markup-compatibility/2006" xmlns:mv="urn:schemas-microsoft-com:mac:vml" xmlns:p="http://schemas.openxmlformats.org/presentationml/2006/main" mc:Ignorable="mv" mc:PreserveAttributes="mv:*" showMasterSp="0" type="objTx" preserve="1">
   <p:cSld name="Content with Caption">
-    <p:bg>
-      <p:bgRef idx="1001">
-        <a:schemeClr val="bg1"/>
-      </p:bgRef>
-    </p:bg>
     <p:spTree>
       <p:nvGrpSpPr>
         <p:cNvPr id="1" name=""/>
@@ -4453,7 +4414,7 @@
             <a:fld id="{60898443-31E4-4A4A-8DA3-E3B90A134AB7}" type="datetimeFigureOut">
               <a:rPr lang="en-US" smtClean="0"/>
               <a:pPr/>
-              <a:t>2/26/15</a:t>
+              <a:t>3/1/15</a:t>
             </a:fld>
             <a:endParaRPr lang="en-US"/>
           </a:p>
@@ -4486,7 +4447,7 @@
     </p:spTree>
   </p:cSld>
   <p:clrMapOvr>
-    <a:overrideClrMapping bg1="lt1" tx1="dk1" bg2="lt2" tx2="dk2" accent1="accent1" accent2="accent2" accent3="accent3" accent4="accent4" accent5="accent5" accent6="accent6" hlink="hlink" folHlink="folHlink"/>
+    <a:masterClrMapping/>
   </p:clrMapOvr>
 </p:sldLayout>
 </file>
@@ -5119,7 +5080,7 @@
             <a:fld id="{60898443-31E4-4A4A-8DA3-E3B90A134AB7}" type="datetimeFigureOut">
               <a:rPr lang="en-US" smtClean="0"/>
               <a:pPr/>
-              <a:t>2/26/15</a:t>
+              <a:t>3/1/15</a:t>
             </a:fld>
             <a:endParaRPr lang="en-US"/>
           </a:p>
@@ -5161,7 +5122,7 @@
 <p:sldMaster xmlns:a="http://schemas.openxmlformats.org/drawingml/2006/main" xmlns:r="http://schemas.openxmlformats.org/officeDocument/2006/relationships" xmlns:mc="http://schemas.openxmlformats.org/markup-compatibility/2006" xmlns:mv="urn:schemas-microsoft-com:mac:vml" xmlns:p="http://schemas.openxmlformats.org/presentationml/2006/main" mc:Ignorable="mv" mc:PreserveAttributes="mv:*">
   <p:cSld>
     <p:bg>
-      <p:bgRef idx="1001">
+      <p:bgRef idx="1003">
         <a:schemeClr val="bg1"/>
       </p:bgRef>
     </p:bg>
@@ -5393,7 +5354,7 @@
             <a:fld id="{60898443-31E4-4A4A-8DA3-E3B90A134AB7}" type="datetimeFigureOut">
               <a:rPr lang="en-US" smtClean="0"/>
               <a:pPr/>
-              <a:t>2/26/15</a:t>
+              <a:t>3/1/15</a:t>
             </a:fld>
             <a:endParaRPr lang="en-US"/>
           </a:p>
@@ -6088,6 +6049,17 @@
           </a:p>
           <a:p>
             <a:r>
+              <a:rPr lang="en-US" dirty="0" smtClean="0"/>
+              <a:t>Rebecca </a:t>
+            </a:r>
+            <a:r>
+              <a:rPr lang="en-US" dirty="0" err="1" smtClean="0"/>
+              <a:t>Bilbro</a:t>
+            </a:r>
+            <a:endParaRPr lang="en-US" dirty="0" smtClean="0"/>
+          </a:p>
+          <a:p>
+            <a:r>
               <a:rPr lang="en-US" dirty="0" err="1" smtClean="0"/>
               <a:t>Bala</a:t>
             </a:r>
@@ -6098,17 +6070,6 @@
             <a:r>
               <a:rPr lang="en-US" dirty="0" err="1" smtClean="0"/>
               <a:t>Venkatesan</a:t>
-            </a:r>
-            <a:endParaRPr lang="en-US" dirty="0" smtClean="0"/>
-          </a:p>
-          <a:p>
-            <a:r>
-              <a:rPr lang="en-US" dirty="0" smtClean="0"/>
-              <a:t>Rebecca </a:t>
-            </a:r>
-            <a:r>
-              <a:rPr lang="en-US" dirty="0" err="1" smtClean="0"/>
-              <a:t>Bilbro</a:t>
             </a:r>
             <a:endParaRPr lang="en-US" dirty="0" smtClean="0"/>
           </a:p>
@@ -6178,17 +6139,47 @@
             <a:r>
               <a:rPr lang="en-US" i="1" dirty="0" smtClean="0">
                 <a:solidFill>
-                  <a:schemeClr val="bg2">
-                    <a:lumMod val="25000"/>
+                  <a:schemeClr val="accent1">
+                    <a:lumMod val="50000"/>
                   </a:schemeClr>
                 </a:solidFill>
               </a:rPr>
-              <a:t>* The views presented here are our own and do not represent the views of the Occupational Safety and Health Administration, U.S. Department of Labor, or any other U.S. government agency.</a:t>
+              <a:t>* The views presented here are our own and do not represent the views of the Occupational Safety and </a:t>
+            </a:r>
+            <a:r>
+              <a:rPr lang="en-US" i="1" dirty="0" smtClean="0">
+                <a:solidFill>
+                  <a:schemeClr val="accent1">
+                    <a:lumMod val="50000"/>
+                  </a:schemeClr>
+                </a:solidFill>
+              </a:rPr>
+              <a:t>Health Administration, </a:t>
+            </a:r>
+            <a:r>
+              <a:rPr lang="en-US" i="1" dirty="0" smtClean="0">
+                <a:solidFill>
+                  <a:schemeClr val="accent1">
+                    <a:lumMod val="50000"/>
+                  </a:schemeClr>
+                </a:solidFill>
+              </a:rPr>
+              <a:t>U.S. Department of Labor, or any other U.S. government agency</a:t>
+            </a:r>
+            <a:r>
+              <a:rPr lang="en-US" i="1" dirty="0" smtClean="0">
+                <a:solidFill>
+                  <a:schemeClr val="accent1">
+                    <a:lumMod val="50000"/>
+                  </a:schemeClr>
+                </a:solidFill>
+              </a:rPr>
+              <a:t>.</a:t>
             </a:r>
             <a:endParaRPr lang="en-US" i="1" dirty="0">
               <a:solidFill>
-                <a:schemeClr val="bg2">
-                  <a:lumMod val="25000"/>
+                <a:schemeClr val="accent1">
+                  <a:lumMod val="50000"/>
                 </a:schemeClr>
               </a:solidFill>
             </a:endParaRPr>
@@ -6200,6 +6191,13 @@
   <p:clrMapOvr>
     <a:masterClrMapping/>
   </p:clrMapOvr>
+  <p:timing>
+    <p:tnLst>
+      <p:par>
+        <p:cTn id="1" dur="indefinite" restart="never" nodeType="tmRoot"/>
+      </p:par>
+    </p:tnLst>
+  </p:timing>
 </p:sld>
 </file>
 
@@ -6230,47 +6228,64 @@
             <p:ph type="title"/>
           </p:nvPr>
         </p:nvSpPr>
+        <p:spPr>
+          <a:xfrm>
+            <a:off x="301752" y="228599"/>
+            <a:ext cx="8534400" cy="963073"/>
+          </a:xfrm>
+        </p:spPr>
+        <p:txBody>
+          <a:bodyPr>
+            <a:normAutofit fontScale="90000"/>
+          </a:bodyPr>
+          <a:lstStyle/>
+          <a:p>
+            <a:r>
+              <a:rPr lang="en-US" dirty="0" smtClean="0"/>
+              <a:t>Geographic dispersion of </a:t>
+            </a:r>
+            <a:br>
+              <a:rPr lang="en-US" dirty="0" smtClean="0"/>
+            </a:br>
+            <a:r>
+              <a:rPr lang="en-US" dirty="0" smtClean="0"/>
+              <a:t>workplace fatalities and catastrophes</a:t>
+            </a:r>
+            <a:endParaRPr lang="en-US" dirty="0"/>
+          </a:p>
+        </p:txBody>
+      </p:sp>
+      <p:pic>
+        <p:nvPicPr>
+          <p:cNvPr id="6" name="Content Placeholder 5" descr="Screen Shot 2015-02-26 at 1.41.09 PM.png"/>
+          <p:cNvPicPr>
+            <a:picLocks noGrp="1" noChangeAspect="1"/>
+          </p:cNvPicPr>
+          <p:nvPr>
+            <p:ph sz="quarter" idx="1"/>
+          </p:nvPr>
+        </p:nvPicPr>
+        <p:blipFill>
+          <a:blip r:embed="rId2"/>
+          <a:srcRect l="-8104" r="-8104"/>
+          <a:stretch>
+            <a:fillRect/>
+          </a:stretch>
+        </p:blipFill>
         <p:spPr/>
-        <p:txBody>
-          <a:bodyPr/>
-          <a:lstStyle/>
-          <a:p>
-            <a:r>
-              <a:rPr lang="en-US" dirty="0" smtClean="0"/>
-              <a:t>What does this visualization tell us?</a:t>
-            </a:r>
-            <a:endParaRPr lang="en-US" dirty="0"/>
-          </a:p>
-        </p:txBody>
-      </p:sp>
-      <p:sp>
-        <p:nvSpPr>
-          <p:cNvPr id="3" name="Content Placeholder 2"/>
-          <p:cNvSpPr>
-            <a:spLocks noGrp="1"/>
-          </p:cNvSpPr>
-          <p:nvPr>
-            <p:ph sz="quarter" idx="1"/>
-          </p:nvPr>
-        </p:nvSpPr>
-        <p:spPr/>
-        <p:txBody>
-          <a:bodyPr/>
-          <a:lstStyle/>
-          <a:p>
-            <a:r>
-              <a:rPr lang="en-US" dirty="0" smtClean="0"/>
-              <a:t>&lt;&lt;conclusions&gt;&gt;</a:t>
-            </a:r>
-            <a:endParaRPr lang="en-US" dirty="0"/>
-          </a:p>
-        </p:txBody>
-      </p:sp>
+      </p:pic>
     </p:spTree>
   </p:cSld>
   <p:clrMapOvr>
     <a:masterClrMapping/>
   </p:clrMapOvr>
+  <p:timing>
+    <p:tnLst>
+      <p:par>
+        <p:cTn id="1" dur="indefinite" restart="never" nodeType="tmRoot"/>
+      </p:par>
+    </p:tnLst>
+  </p:timing>
 </p:sld>
 </file>
 
@@ -6308,7 +6323,7 @@
           <a:p>
             <a:r>
               <a:rPr lang="en-US" dirty="0" smtClean="0"/>
-              <a:t>Join us in exploring OSHA’s datasets</a:t>
+              <a:t>What does this visualization tell us?</a:t>
             </a:r>
             <a:endParaRPr lang="en-US" dirty="0"/>
           </a:p>
@@ -6330,132 +6345,22 @@
           <a:lstStyle/>
           <a:p>
             <a:r>
-              <a:rPr lang="en-US" dirty="0" err="1" smtClean="0"/>
-              <a:t>GitHub</a:t>
-            </a:r>
-            <a:endParaRPr lang="en-US" dirty="0" smtClean="0"/>
-          </a:p>
-          <a:p>
-            <a:pPr lvl="1"/>
-            <a:r>
               <a:rPr lang="en-US" dirty="0" smtClean="0"/>
-              <a:t>Python </a:t>
-            </a:r>
+              <a:t>Some outliers go away when we control for population size (esp. by employee population, by industry sector) but some do not.</a:t>
+            </a:r>
+          </a:p>
+          <a:p>
             <a:r>
               <a:rPr lang="en-US" dirty="0" smtClean="0"/>
-              <a:t>ingestion </a:t>
-            </a:r>
+              <a:t>Interesting case of California vs. Texas – difference in labor laws, politics, workers’ compensation policies.</a:t>
+            </a:r>
+          </a:p>
+          <a:p>
             <a:r>
               <a:rPr lang="en-US" dirty="0" smtClean="0"/>
-              <a:t>and </a:t>
-            </a:r>
-            <a:r>
-              <a:rPr lang="en-US" dirty="0" smtClean="0"/>
-              <a:t>Java </a:t>
-            </a:r>
-            <a:r>
-              <a:rPr lang="en-US" dirty="0" smtClean="0"/>
-              <a:t>heat map </a:t>
-            </a:r>
-            <a:r>
-              <a:rPr lang="en-US" dirty="0" smtClean="0"/>
-              <a:t>code:</a:t>
-            </a:r>
-            <a:r>
-              <a:rPr lang="en-US" dirty="0" smtClean="0"/>
-              <a:t> </a:t>
-            </a:r>
-          </a:p>
-          <a:p>
-            <a:pPr lvl="1">
-              <a:buNone/>
-            </a:pPr>
-            <a:r>
-              <a:rPr lang="en-US" dirty="0" smtClean="0"/>
-              <a:t>		</a:t>
-            </a:r>
-            <a:r>
-              <a:rPr lang="en-US" dirty="0" err="1" smtClean="0"/>
-              <a:t>github.com</a:t>
-            </a:r>
-            <a:r>
-              <a:rPr lang="en-US" dirty="0" err="1" smtClean="0"/>
-              <a:t>/OSHADataDoor/FatalityMapper</a:t>
-            </a:r>
-            <a:endParaRPr lang="en-US" dirty="0" smtClean="0"/>
-          </a:p>
-          <a:p>
-            <a:pPr lvl="1"/>
-            <a:r>
-              <a:rPr lang="en-US" dirty="0" smtClean="0"/>
-              <a:t>Original d</a:t>
-            </a:r>
-            <a:r>
-              <a:rPr lang="en-US" dirty="0" smtClean="0"/>
-              <a:t>ata </a:t>
-            </a:r>
-            <a:r>
-              <a:rPr lang="en-US" dirty="0" smtClean="0"/>
-              <a:t>analytics capstone project:</a:t>
-            </a:r>
-            <a:r>
-              <a:rPr lang="en-US" dirty="0" smtClean="0"/>
-              <a:t> </a:t>
-            </a:r>
-          </a:p>
-          <a:p>
-            <a:pPr lvl="1">
-              <a:buNone/>
-            </a:pPr>
-            <a:r>
-              <a:rPr lang="en-US" dirty="0" smtClean="0"/>
-              <a:t>		</a:t>
-            </a:r>
-            <a:r>
-              <a:rPr lang="en-US" dirty="0" err="1" smtClean="0"/>
-              <a:t>github.com</a:t>
-            </a:r>
-            <a:r>
-              <a:rPr lang="en-US" dirty="0" smtClean="0"/>
-              <a:t>/Colonials/capstone</a:t>
-            </a:r>
-          </a:p>
-          <a:p>
-            <a:endParaRPr lang="en-US" dirty="0" smtClean="0"/>
-          </a:p>
-          <a:p>
-            <a:r>
-              <a:rPr lang="en-US" dirty="0" smtClean="0"/>
-              <a:t>Questions? Find us on LinkedIn</a:t>
-            </a:r>
-          </a:p>
-          <a:p>
-            <a:pPr lvl="1"/>
-            <a:r>
-              <a:rPr lang="en-US" dirty="0" smtClean="0"/>
-              <a:t>Rebecca </a:t>
-            </a:r>
-            <a:r>
-              <a:rPr lang="en-US" dirty="0" err="1" smtClean="0"/>
-              <a:t>Bilbro</a:t>
-            </a:r>
-            <a:endParaRPr lang="en-US" dirty="0" smtClean="0"/>
-          </a:p>
-          <a:p>
-            <a:pPr lvl="1"/>
-            <a:r>
-              <a:rPr lang="en-US" dirty="0" err="1" smtClean="0"/>
-              <a:t>Bala</a:t>
-            </a:r>
-            <a:r>
-              <a:rPr lang="en-US" dirty="0" smtClean="0"/>
-              <a:t> </a:t>
-            </a:r>
-            <a:r>
-              <a:rPr lang="en-US" dirty="0" err="1" smtClean="0"/>
-              <a:t>Venkatesan</a:t>
-            </a:r>
-            <a:endParaRPr lang="en-US" dirty="0" smtClean="0"/>
+              <a:t>What will the new reporting data tell us?</a:t>
+            </a:r>
+            <a:endParaRPr lang="en-US" dirty="0"/>
           </a:p>
         </p:txBody>
       </p:sp>
@@ -6464,6 +6369,205 @@
   <p:clrMapOvr>
     <a:masterClrMapping/>
   </p:clrMapOvr>
+  <p:timing>
+    <p:tnLst>
+      <p:par>
+        <p:cTn id="1" dur="indefinite" restart="never" nodeType="tmRoot"/>
+      </p:par>
+    </p:tnLst>
+  </p:timing>
+</p:sld>
+</file>
+
+<file path=ppt/slides/slide12.xml><?xml version="1.0" encoding="utf-8"?>
+<p:sld xmlns:a="http://schemas.openxmlformats.org/drawingml/2006/main" xmlns:r="http://schemas.openxmlformats.org/officeDocument/2006/relationships" xmlns:mc="http://schemas.openxmlformats.org/markup-compatibility/2006" xmlns:mv="urn:schemas-microsoft-com:mac:vml" xmlns:p="http://schemas.openxmlformats.org/presentationml/2006/main" mc:Ignorable="mv" mc:PreserveAttributes="mv:*">
+  <p:cSld>
+    <p:spTree>
+      <p:nvGrpSpPr>
+        <p:cNvPr id="1" name=""/>
+        <p:cNvGrpSpPr/>
+        <p:nvPr/>
+      </p:nvGrpSpPr>
+      <p:grpSpPr>
+        <a:xfrm>
+          <a:off x="0" y="0"/>
+          <a:ext cx="0" cy="0"/>
+          <a:chOff x="0" y="0"/>
+          <a:chExt cx="0" cy="0"/>
+        </a:xfrm>
+      </p:grpSpPr>
+      <p:sp>
+        <p:nvSpPr>
+          <p:cNvPr id="2" name="Title 1"/>
+          <p:cNvSpPr>
+            <a:spLocks noGrp="1"/>
+          </p:cNvSpPr>
+          <p:nvPr>
+            <p:ph type="title"/>
+          </p:nvPr>
+        </p:nvSpPr>
+        <p:spPr/>
+        <p:txBody>
+          <a:bodyPr/>
+          <a:lstStyle/>
+          <a:p>
+            <a:r>
+              <a:rPr lang="en-US" dirty="0" smtClean="0"/>
+              <a:t>Join us in exploring OSHA’s </a:t>
+            </a:r>
+            <a:r>
+              <a:rPr lang="en-US" dirty="0" smtClean="0"/>
+              <a:t>datasets!</a:t>
+            </a:r>
+            <a:endParaRPr lang="en-US" dirty="0"/>
+          </a:p>
+        </p:txBody>
+      </p:sp>
+      <p:sp>
+        <p:nvSpPr>
+          <p:cNvPr id="3" name="Content Placeholder 2"/>
+          <p:cNvSpPr>
+            <a:spLocks noGrp="1"/>
+          </p:cNvSpPr>
+          <p:nvPr>
+            <p:ph sz="quarter" idx="1"/>
+          </p:nvPr>
+        </p:nvSpPr>
+        <p:spPr/>
+        <p:txBody>
+          <a:bodyPr/>
+          <a:lstStyle/>
+          <a:p>
+            <a:r>
+              <a:rPr lang="en-US" dirty="0" err="1" smtClean="0"/>
+              <a:t>GitHub</a:t>
+            </a:r>
+            <a:endParaRPr lang="en-US" dirty="0" smtClean="0"/>
+          </a:p>
+          <a:p>
+            <a:pPr lvl="1"/>
+            <a:r>
+              <a:rPr lang="en-US" dirty="0" smtClean="0"/>
+              <a:t>Python ingestion and</a:t>
+            </a:r>
+            <a:r>
+              <a:rPr lang="en-US" dirty="0" smtClean="0"/>
+              <a:t> </a:t>
+            </a:r>
+            <a:r>
+              <a:rPr lang="en-US" dirty="0" err="1" smtClean="0"/>
+              <a:t>Bokeh</a:t>
+            </a:r>
+            <a:r>
+              <a:rPr lang="en-US" dirty="0" smtClean="0"/>
+              <a:t> heat </a:t>
+            </a:r>
+            <a:r>
+              <a:rPr lang="en-US" dirty="0" smtClean="0"/>
+              <a:t>map code: </a:t>
+            </a:r>
+          </a:p>
+          <a:p>
+            <a:pPr lvl="1">
+              <a:buNone/>
+            </a:pPr>
+            <a:r>
+              <a:rPr lang="en-US" dirty="0" smtClean="0"/>
+              <a:t>		</a:t>
+            </a:r>
+            <a:r>
+              <a:rPr lang="en-US" dirty="0" err="1" smtClean="0"/>
+              <a:t>github.com/OSHADataDoor/FatalityMapper</a:t>
+            </a:r>
+            <a:endParaRPr lang="en-US" dirty="0" smtClean="0"/>
+          </a:p>
+          <a:p>
+            <a:pPr lvl="1"/>
+            <a:r>
+              <a:rPr lang="en-US" dirty="0" smtClean="0"/>
+              <a:t>Original</a:t>
+            </a:r>
+            <a:r>
+              <a:rPr lang="en-US" dirty="0" smtClean="0"/>
+              <a:t> Georgetown Univ. data </a:t>
+            </a:r>
+            <a:r>
+              <a:rPr lang="en-US" dirty="0" smtClean="0"/>
+              <a:t>analytics capstone project: </a:t>
+            </a:r>
+          </a:p>
+          <a:p>
+            <a:pPr lvl="1">
+              <a:buNone/>
+            </a:pPr>
+            <a:r>
+              <a:rPr lang="en-US" dirty="0" smtClean="0"/>
+              <a:t>		</a:t>
+            </a:r>
+            <a:r>
+              <a:rPr lang="en-US" dirty="0" err="1" smtClean="0"/>
+              <a:t>github.com</a:t>
+            </a:r>
+            <a:r>
+              <a:rPr lang="en-US" dirty="0" smtClean="0"/>
+              <a:t>/Colonials/capstone</a:t>
+            </a:r>
+          </a:p>
+          <a:p>
+            <a:endParaRPr lang="en-US" dirty="0" smtClean="0"/>
+          </a:p>
+          <a:p>
+            <a:r>
+              <a:rPr lang="en-US" dirty="0" smtClean="0"/>
+              <a:t>Questions? Find us on </a:t>
+            </a:r>
+            <a:r>
+              <a:rPr lang="en-US" dirty="0" smtClean="0"/>
+              <a:t>LinkedIn!</a:t>
+            </a:r>
+          </a:p>
+          <a:p>
+            <a:pPr lvl="1"/>
+            <a:r>
+              <a:rPr lang="en-US" dirty="0" smtClean="0"/>
+              <a:t>Rebecca </a:t>
+            </a:r>
+            <a:r>
+              <a:rPr lang="en-US" dirty="0" err="1" smtClean="0"/>
+              <a:t>Bilbro</a:t>
+            </a:r>
+            <a:endParaRPr lang="en-US" dirty="0" smtClean="0"/>
+          </a:p>
+          <a:p>
+            <a:pPr lvl="1"/>
+            <a:r>
+              <a:rPr lang="en-US" dirty="0" err="1" smtClean="0"/>
+              <a:t>Bala</a:t>
+            </a:r>
+            <a:r>
+              <a:rPr lang="en-US" dirty="0" smtClean="0"/>
+              <a:t> </a:t>
+            </a:r>
+            <a:r>
+              <a:rPr lang="en-US" dirty="0" err="1" smtClean="0"/>
+              <a:t>Venkatesan</a:t>
+            </a:r>
+            <a:endParaRPr lang="en-US" dirty="0" smtClean="0"/>
+          </a:p>
+        </p:txBody>
+      </p:sp>
+    </p:spTree>
+  </p:cSld>
+  <p:clrMapOvr>
+    <a:masterClrMapping/>
+  </p:clrMapOvr>
+  <p:timing>
+    <p:tnLst>
+      <p:par>
+        <p:cTn id="1" dur="indefinite" restart="never" nodeType="tmRoot"/>
+      </p:par>
+    </p:tnLst>
+  </p:timing>
 </p:sld>
 </file>
 
@@ -6555,6 +6659,13 @@
   <p:clrMapOvr>
     <a:masterClrMapping/>
   </p:clrMapOvr>
+  <p:timing>
+    <p:tnLst>
+      <p:par>
+        <p:cTn id="1" dur="indefinite" restart="never" nodeType="tmRoot"/>
+      </p:par>
+    </p:tnLst>
+  </p:timing>
 </p:sld>
 </file>
 
@@ -6656,6 +6767,13 @@
   <p:clrMapOvr>
     <a:masterClrMapping/>
   </p:clrMapOvr>
+  <p:timing>
+    <p:tnLst>
+      <p:par>
+        <p:cTn id="1" dur="indefinite" restart="never" nodeType="tmRoot"/>
+      </p:par>
+    </p:tnLst>
+  </p:timing>
 </p:sld>
 </file>
 
@@ -6810,6 +6928,13 @@
   <p:clrMapOvr>
     <a:masterClrMapping/>
   </p:clrMapOvr>
+  <p:timing>
+    <p:tnLst>
+      <p:par>
+        <p:cTn id="1" dur="indefinite" restart="never" nodeType="tmRoot"/>
+      </p:par>
+    </p:tnLst>
+  </p:timing>
 </p:sld>
 </file>
 
@@ -6877,6 +7002,13 @@
   <p:clrMapOvr>
     <a:masterClrMapping/>
   </p:clrMapOvr>
+  <p:timing>
+    <p:tnLst>
+      <p:par>
+        <p:cTn id="1" dur="indefinite" restart="never" nodeType="tmRoot"/>
+      </p:par>
+    </p:tnLst>
+  </p:timing>
 </p:sld>
 </file>
 
@@ -6949,6 +7081,13 @@
   <p:clrMapOvr>
     <a:masterClrMapping/>
   </p:clrMapOvr>
+  <p:timing>
+    <p:tnLst>
+      <p:par>
+        <p:cTn id="1" dur="indefinite" restart="never" nodeType="tmRoot"/>
+      </p:par>
+    </p:tnLst>
+  </p:timing>
 </p:sld>
 </file>
 
@@ -6979,73 +7118,66 @@
             <p:ph type="title"/>
           </p:nvPr>
         </p:nvSpPr>
-        <p:spPr>
-          <a:xfrm>
-            <a:off x="301752" y="228599"/>
-            <a:ext cx="8534400" cy="963073"/>
-          </a:xfrm>
-        </p:spPr>
-        <p:txBody>
-          <a:bodyPr>
-            <a:normAutofit fontScale="90000"/>
-          </a:bodyPr>
+        <p:spPr/>
+        <p:txBody>
+          <a:bodyPr/>
           <a:lstStyle/>
           <a:p>
             <a:r>
               <a:rPr lang="en-US" dirty="0" smtClean="0"/>
-              <a:t>Geographic </a:t>
-            </a:r>
+              <a:t>Preliminary findings</a:t>
+            </a:r>
+            <a:endParaRPr lang="en-US" dirty="0"/>
+          </a:p>
+        </p:txBody>
+      </p:sp>
+      <p:sp>
+        <p:nvSpPr>
+          <p:cNvPr id="5" name="Content Placeholder 4"/>
+          <p:cNvSpPr>
+            <a:spLocks noGrp="1"/>
+          </p:cNvSpPr>
+          <p:nvPr>
+            <p:ph sz="quarter" idx="1"/>
+          </p:nvPr>
+        </p:nvSpPr>
+        <p:spPr/>
+        <p:txBody>
+          <a:bodyPr/>
+          <a:lstStyle/>
+          <a:p>
             <a:r>
               <a:rPr lang="en-US" dirty="0" smtClean="0"/>
-              <a:t>dispersion of</a:t>
-            </a:r>
+              <a:t>Employment rates and workplace fatalities are inversely correlated, particularly in the construction sector.</a:t>
+            </a:r>
+          </a:p>
+          <a:p>
             <a:r>
               <a:rPr lang="en-US" dirty="0" smtClean="0"/>
-              <a:t> </a:t>
-            </a:r>
-            <a:br>
+              <a:t>For 1990-2010: increase in fatalities in states just north of Mason-Dixon line correlated with a matching decline in states just south.</a:t>
+            </a:r>
+          </a:p>
+          <a:p>
+            <a:r>
               <a:rPr lang="en-US" dirty="0" smtClean="0"/>
-            </a:br>
-            <a:r>
-              <a:rPr lang="en-US" dirty="0" smtClean="0"/>
-              <a:t>workplace fatalities</a:t>
-            </a:r>
-            <a:r>
-              <a:rPr lang="en-US" dirty="0" smtClean="0"/>
-              <a:t> and </a:t>
-            </a:r>
-            <a:r>
-              <a:rPr lang="en-US" dirty="0" smtClean="0"/>
-              <a:t>catastrophes</a:t>
+              <a:t>Outliers (California, Texas, Oregon, Florida, Maryland) – due merely to larger populations, or something else?</a:t>
             </a:r>
             <a:endParaRPr lang="en-US" dirty="0"/>
           </a:p>
         </p:txBody>
       </p:sp>
-      <p:pic>
-        <p:nvPicPr>
-          <p:cNvPr id="4" name="Content Placeholder 3" descr="Screen Shot 2015-02-26 at 1.35.49 PM.png"/>
-          <p:cNvPicPr>
-            <a:picLocks noGrp="1" noChangeAspect="1"/>
-          </p:cNvPicPr>
-          <p:nvPr>
-            <p:ph sz="quarter" idx="1"/>
-          </p:nvPr>
-        </p:nvPicPr>
-        <p:blipFill>
-          <a:blip r:embed="rId2"/>
-          <a:srcRect l="-7880" r="-7880"/>
-          <a:stretch>
-            <a:fillRect/>
-          </a:stretch>
-        </p:blipFill>
-        <p:spPr/>
-      </p:pic>
     </p:spTree>
   </p:cSld>
   <p:clrMapOvr>
     <a:masterClrMapping/>
   </p:clrMapOvr>
+  <p:timing>
+    <p:tnLst>
+      <p:par>
+        <p:cTn id="1" dur="indefinite" restart="never" nodeType="tmRoot"/>
+      </p:par>
+    </p:tnLst>
+  </p:timing>
 </p:sld>
 </file>
 
@@ -7090,30 +7222,14 @@
           <a:p>
             <a:r>
               <a:rPr lang="en-US" dirty="0" smtClean="0"/>
-              <a:t>Geographic </a:t>
-            </a:r>
-            <a:r>
-              <a:rPr lang="en-US" dirty="0" smtClean="0"/>
-              <a:t>dispersion of</a:t>
-            </a:r>
-            <a:r>
-              <a:rPr lang="en-US" dirty="0" smtClean="0"/>
-              <a:t> </a:t>
+              <a:t>Geographic dispersion of </a:t>
             </a:r>
             <a:br>
               <a:rPr lang="en-US" dirty="0" smtClean="0"/>
             </a:br>
             <a:r>
               <a:rPr lang="en-US" dirty="0" smtClean="0"/>
-              <a:t>workplace fatalities</a:t>
-            </a:r>
-            <a:r>
-              <a:rPr lang="en-US" dirty="0" smtClean="0"/>
-              <a:t> and </a:t>
-            </a:r>
-            <a:r>
-              <a:rPr lang="en-US" dirty="0" smtClean="0"/>
-              <a:t>catastrophes</a:t>
+              <a:t>workplace fatalities and catastrophes</a:t>
             </a:r>
             <a:endParaRPr lang="en-US" dirty="0"/>
           </a:p>
@@ -7121,7 +7237,7 @@
       </p:sp>
       <p:pic>
         <p:nvPicPr>
-          <p:cNvPr id="6" name="Content Placeholder 5" descr="Screen Shot 2015-02-26 at 1.38.31 PM.png"/>
+          <p:cNvPr id="4" name="Content Placeholder 3" descr="Screen Shot 2015-02-26 at 1.35.49 PM.png"/>
           <p:cNvPicPr>
             <a:picLocks noGrp="1" noChangeAspect="1"/>
           </p:cNvPicPr>
@@ -7131,7 +7247,7 @@
         </p:nvPicPr>
         <p:blipFill>
           <a:blip r:embed="rId2"/>
-          <a:srcRect l="-7543" r="-7543"/>
+          <a:srcRect l="-7880" r="-7880"/>
           <a:stretch>
             <a:fillRect/>
           </a:stretch>
@@ -7143,6 +7259,13 @@
   <p:clrMapOvr>
     <a:masterClrMapping/>
   </p:clrMapOvr>
+  <p:timing>
+    <p:tnLst>
+      <p:par>
+        <p:cTn id="1" dur="indefinite" restart="never" nodeType="tmRoot"/>
+      </p:par>
+    </p:tnLst>
+  </p:timing>
 </p:sld>
 </file>
 
@@ -7187,30 +7310,14 @@
           <a:p>
             <a:r>
               <a:rPr lang="en-US" dirty="0" smtClean="0"/>
-              <a:t>Geographic </a:t>
-            </a:r>
-            <a:r>
-              <a:rPr lang="en-US" dirty="0" smtClean="0"/>
-              <a:t>dispersion of</a:t>
-            </a:r>
-            <a:r>
-              <a:rPr lang="en-US" dirty="0" smtClean="0"/>
-              <a:t> </a:t>
+              <a:t>Geographic dispersion of </a:t>
             </a:r>
             <a:br>
               <a:rPr lang="en-US" dirty="0" smtClean="0"/>
             </a:br>
             <a:r>
               <a:rPr lang="en-US" dirty="0" smtClean="0"/>
-              <a:t>workplace fatalities</a:t>
-            </a:r>
-            <a:r>
-              <a:rPr lang="en-US" dirty="0" smtClean="0"/>
-              <a:t> and </a:t>
-            </a:r>
-            <a:r>
-              <a:rPr lang="en-US" dirty="0" smtClean="0"/>
-              <a:t>catastrophes</a:t>
+              <a:t>workplace fatalities and catastrophes</a:t>
             </a:r>
             <a:endParaRPr lang="en-US" dirty="0"/>
           </a:p>
@@ -7218,7 +7325,7 @@
       </p:sp>
       <p:pic>
         <p:nvPicPr>
-          <p:cNvPr id="6" name="Content Placeholder 5" descr="Screen Shot 2015-02-26 at 1.41.09 PM.png"/>
+          <p:cNvPr id="6" name="Content Placeholder 5" descr="Screen Shot 2015-02-26 at 1.38.31 PM.png"/>
           <p:cNvPicPr>
             <a:picLocks noGrp="1" noChangeAspect="1"/>
           </p:cNvPicPr>
@@ -7228,7 +7335,7 @@
         </p:nvPicPr>
         <p:blipFill>
           <a:blip r:embed="rId2"/>
-          <a:srcRect l="-8104" r="-8104"/>
+          <a:srcRect l="-7543" r="-7543"/>
           <a:stretch>
             <a:fillRect/>
           </a:stretch>
@@ -7240,13 +7347,20 @@
   <p:clrMapOvr>
     <a:masterClrMapping/>
   </p:clrMapOvr>
+  <p:timing>
+    <p:tnLst>
+      <p:par>
+        <p:cTn id="1" dur="indefinite" restart="never" nodeType="tmRoot"/>
+      </p:par>
+    </p:tnLst>
+  </p:timing>
 </p:sld>
 </file>
 
 <file path=ppt/theme/theme1.xml><?xml version="1.0" encoding="utf-8"?>
 <a:theme xmlns:a="http://schemas.openxmlformats.org/drawingml/2006/main" name="Civic">
   <a:themeElements>
-    <a:clrScheme name="Civic">
+    <a:clrScheme name="Custom 5">
       <a:dk1>
         <a:sysClr val="windowText" lastClr="000000"/>
       </a:dk1>
@@ -7254,34 +7368,34 @@
         <a:sysClr val="window" lastClr="FFFFFF"/>
       </a:lt1>
       <a:dk2>
-        <a:srgbClr val="646B86"/>
+        <a:srgbClr val="323232"/>
       </a:dk2>
       <a:lt2>
-        <a:srgbClr val="C5D1D7"/>
+        <a:srgbClr val="E3DED1"/>
       </a:lt2>
       <a:accent1>
-        <a:srgbClr val="D16349"/>
+        <a:srgbClr val="7A2B1C"/>
       </a:accent1>
       <a:accent2>
-        <a:srgbClr val="CCB400"/>
+        <a:srgbClr val="9F2936"/>
       </a:accent2>
       <a:accent3>
-        <a:srgbClr val="8CADAE"/>
+        <a:srgbClr val="1B587C"/>
       </a:accent3>
       <a:accent4>
-        <a:srgbClr val="8C7B70"/>
+        <a:srgbClr val="4E8542"/>
       </a:accent4>
       <a:accent5>
-        <a:srgbClr val="8FB08C"/>
+        <a:srgbClr val="604878"/>
       </a:accent5>
       <a:accent6>
-        <a:srgbClr val="D19049"/>
+        <a:srgbClr val="C19859"/>
       </a:accent6>
       <a:hlink>
-        <a:srgbClr val="00A3D6"/>
+        <a:srgbClr val="6B9F25"/>
       </a:hlink>
       <a:folHlink>
-        <a:srgbClr val="694F07"/>
+        <a:srgbClr val="B26B02"/>
       </a:folHlink>
     </a:clrScheme>
     <a:fontScheme name="Civic">

</xml_diff>

<commit_message>
finalized PPT and updated description
</commit_message>
<xml_diff>
--- a/presentation/DIDCtalk.pptx
+++ b/presentation/DIDCtalk.pptx
@@ -9,14 +9,15 @@
     <p:sldId id="257" r:id="rId3"/>
     <p:sldId id="259" r:id="rId4"/>
     <p:sldId id="260" r:id="rId5"/>
-    <p:sldId id="263" r:id="rId6"/>
-    <p:sldId id="261" r:id="rId7"/>
-    <p:sldId id="269" r:id="rId8"/>
-    <p:sldId id="262" r:id="rId9"/>
-    <p:sldId id="266" r:id="rId10"/>
-    <p:sldId id="268" r:id="rId11"/>
-    <p:sldId id="264" r:id="rId12"/>
-    <p:sldId id="265" r:id="rId13"/>
+    <p:sldId id="271" r:id="rId6"/>
+    <p:sldId id="263" r:id="rId7"/>
+    <p:sldId id="270" r:id="rId8"/>
+    <p:sldId id="261" r:id="rId9"/>
+    <p:sldId id="262" r:id="rId10"/>
+    <p:sldId id="266" r:id="rId11"/>
+    <p:sldId id="268" r:id="rId12"/>
+    <p:sldId id="272" r:id="rId13"/>
+    <p:sldId id="265" r:id="rId14"/>
   </p:sldIdLst>
   <p:sldSz cx="9144000" cy="6858000" type="screen4x3"/>
   <p:notesSz cx="6858000" cy="9144000"/>
@@ -394,7 +395,7 @@
             <a:fld id="{60898443-31E4-4A4A-8DA3-E3B90A134AB7}" type="datetimeFigureOut">
               <a:rPr lang="en-US" smtClean="0"/>
               <a:pPr/>
-              <a:t>3/1/15</a:t>
+              <a:t>3/4/15</a:t>
             </a:fld>
             <a:endParaRPr lang="en-US"/>
           </a:p>
@@ -784,7 +785,7 @@
             <a:fld id="{60898443-31E4-4A4A-8DA3-E3B90A134AB7}" type="datetimeFigureOut">
               <a:rPr lang="en-US" smtClean="0"/>
               <a:pPr/>
-              <a:t>3/1/15</a:t>
+              <a:t>3/4/15</a:t>
             </a:fld>
             <a:endParaRPr lang="en-US"/>
           </a:p>
@@ -1314,7 +1315,7 @@
             <a:fld id="{60898443-31E4-4A4A-8DA3-E3B90A134AB7}" type="datetimeFigureOut">
               <a:rPr lang="en-US" smtClean="0"/>
               <a:pPr/>
-              <a:t>3/1/15</a:t>
+              <a:t>3/4/15</a:t>
             </a:fld>
             <a:endParaRPr lang="en-US"/>
           </a:p>
@@ -1443,7 +1444,7 @@
             <a:fld id="{60898443-31E4-4A4A-8DA3-E3B90A134AB7}" type="datetimeFigureOut">
               <a:rPr lang="en-US" smtClean="0"/>
               <a:pPr/>
-              <a:t>3/1/15</a:t>
+              <a:t>3/4/15</a:t>
             </a:fld>
             <a:endParaRPr lang="en-US"/>
           </a:p>
@@ -1983,7 +1984,7 @@
             <a:fld id="{60898443-31E4-4A4A-8DA3-E3B90A134AB7}" type="datetimeFigureOut">
               <a:rPr lang="en-US" smtClean="0"/>
               <a:pPr/>
-              <a:t>3/1/15</a:t>
+              <a:t>3/4/15</a:t>
             </a:fld>
             <a:endParaRPr lang="en-US"/>
           </a:p>
@@ -2275,7 +2276,7 @@
             <a:fld id="{60898443-31E4-4A4A-8DA3-E3B90A134AB7}" type="datetimeFigureOut">
               <a:rPr lang="en-US" smtClean="0"/>
               <a:pPr/>
-              <a:t>3/1/15</a:t>
+              <a:t>3/4/15</a:t>
             </a:fld>
             <a:endParaRPr lang="en-US"/>
           </a:p>
@@ -2931,7 +2932,7 @@
             <a:fld id="{60898443-31E4-4A4A-8DA3-E3B90A134AB7}" type="datetimeFigureOut">
               <a:rPr lang="en-US" smtClean="0"/>
               <a:pPr/>
-              <a:t>3/1/15</a:t>
+              <a:t>3/4/15</a:t>
             </a:fld>
             <a:endParaRPr lang="en-US"/>
           </a:p>
@@ -3369,7 +3370,7 @@
             <a:fld id="{60898443-31E4-4A4A-8DA3-E3B90A134AB7}" type="datetimeFigureOut">
               <a:rPr lang="en-US" smtClean="0"/>
               <a:pPr/>
-              <a:t>3/1/15</a:t>
+              <a:t>3/4/15</a:t>
             </a:fld>
             <a:endParaRPr lang="en-US"/>
           </a:p>
@@ -3684,7 +3685,7 @@
             <a:fld id="{60898443-31E4-4A4A-8DA3-E3B90A134AB7}" type="datetimeFigureOut">
               <a:rPr lang="en-US" smtClean="0"/>
               <a:pPr/>
-              <a:t>3/1/15</a:t>
+              <a:t>3/4/15</a:t>
             </a:fld>
             <a:endParaRPr lang="en-US"/>
           </a:p>
@@ -4414,7 +4415,7 @@
             <a:fld id="{60898443-31E4-4A4A-8DA3-E3B90A134AB7}" type="datetimeFigureOut">
               <a:rPr lang="en-US" smtClean="0"/>
               <a:pPr/>
-              <a:t>3/1/15</a:t>
+              <a:t>3/4/15</a:t>
             </a:fld>
             <a:endParaRPr lang="en-US"/>
           </a:p>
@@ -5080,7 +5081,7 @@
             <a:fld id="{60898443-31E4-4A4A-8DA3-E3B90A134AB7}" type="datetimeFigureOut">
               <a:rPr lang="en-US" smtClean="0"/>
               <a:pPr/>
-              <a:t>3/1/15</a:t>
+              <a:t>3/4/15</a:t>
             </a:fld>
             <a:endParaRPr lang="en-US"/>
           </a:p>
@@ -5354,7 +5355,7 @@
             <a:fld id="{60898443-31E4-4A4A-8DA3-E3B90A134AB7}" type="datetimeFigureOut">
               <a:rPr lang="en-US" smtClean="0"/>
               <a:pPr/>
-              <a:t>3/1/15</a:t>
+              <a:t>3/4/15</a:t>
             </a:fld>
             <a:endParaRPr lang="en-US"/>
           </a:p>
@@ -6144,37 +6145,7 @@
                   </a:schemeClr>
                 </a:solidFill>
               </a:rPr>
-              <a:t>* The views presented here are our own and do not represent the views of the Occupational Safety and </a:t>
-            </a:r>
-            <a:r>
-              <a:rPr lang="en-US" i="1" dirty="0" smtClean="0">
-                <a:solidFill>
-                  <a:schemeClr val="accent1">
-                    <a:lumMod val="50000"/>
-                  </a:schemeClr>
-                </a:solidFill>
-              </a:rPr>
-              <a:t>Health Administration, </a:t>
-            </a:r>
-            <a:r>
-              <a:rPr lang="en-US" i="1" dirty="0" smtClean="0">
-                <a:solidFill>
-                  <a:schemeClr val="accent1">
-                    <a:lumMod val="50000"/>
-                  </a:schemeClr>
-                </a:solidFill>
-              </a:rPr>
-              <a:t>U.S. Department of Labor, or any other U.S. government agency</a:t>
-            </a:r>
-            <a:r>
-              <a:rPr lang="en-US" i="1" dirty="0" smtClean="0">
-                <a:solidFill>
-                  <a:schemeClr val="accent1">
-                    <a:lumMod val="50000"/>
-                  </a:schemeClr>
-                </a:solidFill>
-              </a:rPr>
-              <a:t>.</a:t>
+              <a:t>* The views presented here are our own and do not represent the views of the Occupational Safety and Health Administration, U.S. Department of Labor, or any other U.S. government agency.</a:t>
             </a:r>
             <a:endParaRPr lang="en-US" i="1" dirty="0">
               <a:solidFill>
@@ -6241,39 +6212,98 @@
           <a:lstStyle/>
           <a:p>
             <a:r>
-              <a:rPr lang="en-US" dirty="0" smtClean="0"/>
+              <a:rPr lang="en-US" b="1" dirty="0" smtClean="0"/>
               <a:t>Geographic dispersion of </a:t>
             </a:r>
             <a:br>
-              <a:rPr lang="en-US" dirty="0" smtClean="0"/>
+              <a:rPr lang="en-US" b="1" dirty="0" smtClean="0"/>
             </a:br>
             <a:r>
-              <a:rPr lang="en-US" dirty="0" smtClean="0"/>
+              <a:rPr lang="en-US" b="1" dirty="0" smtClean="0"/>
               <a:t>workplace fatalities and catastrophes</a:t>
             </a:r>
-            <a:endParaRPr lang="en-US" dirty="0"/>
+            <a:endParaRPr lang="en-US" b="1" dirty="0"/>
           </a:p>
         </p:txBody>
       </p:sp>
       <p:pic>
         <p:nvPicPr>
-          <p:cNvPr id="6" name="Content Placeholder 5" descr="Screen Shot 2015-02-26 at 1.41.09 PM.png"/>
+          <p:cNvPr id="7" name="Picture 6"/>
           <p:cNvPicPr>
-            <a:picLocks noGrp="1" noChangeAspect="1"/>
+            <a:picLocks noChangeAspect="1"/>
           </p:cNvPicPr>
-          <p:nvPr>
-            <p:ph sz="quarter" idx="1"/>
-          </p:nvPr>
+          <p:nvPr/>
         </p:nvPicPr>
         <p:blipFill>
           <a:blip r:embed="rId2"/>
-          <a:srcRect l="-8104" r="-8104"/>
           <a:stretch>
             <a:fillRect/>
           </a:stretch>
         </p:blipFill>
-        <p:spPr/>
+        <p:spPr>
+          <a:xfrm>
+            <a:off x="865235" y="1553521"/>
+            <a:ext cx="7365492" cy="4622292"/>
+          </a:xfrm>
+          <a:prstGeom prst="rect">
+            <a:avLst/>
+          </a:prstGeom>
+        </p:spPr>
       </p:pic>
+      <p:sp>
+        <p:nvSpPr>
+          <p:cNvPr id="4" name="TextBox 3"/>
+          <p:cNvSpPr txBox="1"/>
+          <p:nvPr/>
+        </p:nvSpPr>
+        <p:spPr>
+          <a:xfrm>
+            <a:off x="4833604" y="3071036"/>
+            <a:ext cx="4002548" cy="1631216"/>
+          </a:xfrm>
+          <a:prstGeom prst="rect">
+            <a:avLst/>
+          </a:prstGeom>
+          <a:solidFill>
+            <a:schemeClr val="bg1">
+              <a:alpha val="85000"/>
+            </a:schemeClr>
+          </a:solidFill>
+          <a:effectLst>
+            <a:outerShdw blurRad="50800" dist="38100" dir="2700000" algn="tl" rotWithShape="0">
+              <a:srgbClr val="000000">
+                <a:alpha val="43000"/>
+              </a:srgbClr>
+            </a:outerShdw>
+          </a:effectLst>
+        </p:spPr>
+        <p:txBody>
+          <a:bodyPr wrap="square" rtlCol="0">
+            <a:spAutoFit/>
+          </a:bodyPr>
+          <a:lstStyle/>
+          <a:p>
+            <a:pPr>
+              <a:buFont typeface="Symbol" charset="2"/>
+              <a:buChar char=""/>
+            </a:pPr>
+            <a:r>
+              <a:rPr lang="en-US" sz="2000" dirty="0" smtClean="0"/>
+              <a:t>Is California overrepresented in the fatalities/catastrophes reported to OSHA?</a:t>
+            </a:r>
+          </a:p>
+          <a:p>
+            <a:pPr>
+              <a:buFont typeface="Symbol" charset="2"/>
+              <a:buChar char=""/>
+            </a:pPr>
+            <a:r>
+              <a:rPr lang="en-US" sz="2000" dirty="0" smtClean="0"/>
+              <a:t>Remains an outlier even after correcting for worker population.</a:t>
+            </a:r>
+          </a:p>
+        </p:txBody>
+      </p:sp>
     </p:spTree>
   </p:cSld>
   <p:clrMapOvr>
@@ -6282,9 +6312,126 @@
   <p:timing>
     <p:tnLst>
       <p:par>
-        <p:cTn id="1" dur="indefinite" restart="never" nodeType="tmRoot"/>
+        <p:cTn id="1" dur="indefinite" restart="never" nodeType="tmRoot">
+          <p:childTnLst>
+            <p:seq concurrent="1" nextAc="seek">
+              <p:cTn id="2" dur="indefinite" nodeType="mainSeq">
+                <p:childTnLst>
+                  <p:par>
+                    <p:cTn id="3" fill="hold">
+                      <p:stCondLst>
+                        <p:cond delay="indefinite"/>
+                      </p:stCondLst>
+                      <p:childTnLst>
+                        <p:par>
+                          <p:cTn id="4" fill="hold">
+                            <p:stCondLst>
+                              <p:cond delay="0"/>
+                            </p:stCondLst>
+                            <p:childTnLst>
+                              <p:par>
+                                <p:cTn id="5" presetID="2" presetClass="entr" presetSubtype="4" fill="hold" grpId="0" nodeType="clickEffect">
+                                  <p:stCondLst>
+                                    <p:cond delay="0"/>
+                                  </p:stCondLst>
+                                  <p:childTnLst>
+                                    <p:set>
+                                      <p:cBhvr>
+                                        <p:cTn id="6" dur="1" fill="hold">
+                                          <p:stCondLst>
+                                            <p:cond delay="0"/>
+                                          </p:stCondLst>
+                                        </p:cTn>
+                                        <p:tgtEl>
+                                          <p:spTgt spid="4"/>
+                                        </p:tgtEl>
+                                        <p:attrNameLst>
+                                          <p:attrName>style.visibility</p:attrName>
+                                        </p:attrNameLst>
+                                      </p:cBhvr>
+                                      <p:to>
+                                        <p:strVal val="visible"/>
+                                      </p:to>
+                                    </p:set>
+                                    <p:anim calcmode="lin" valueType="num">
+                                      <p:cBhvr additive="base">
+                                        <p:cTn id="7" dur="500" fill="hold"/>
+                                        <p:tgtEl>
+                                          <p:spTgt spid="4"/>
+                                        </p:tgtEl>
+                                        <p:attrNameLst>
+                                          <p:attrName>ppt_x</p:attrName>
+                                        </p:attrNameLst>
+                                      </p:cBhvr>
+                                      <p:tavLst>
+                                        <p:tav tm="0">
+                                          <p:val>
+                                            <p:strVal val="#ppt_x"/>
+                                          </p:val>
+                                        </p:tav>
+                                        <p:tav tm="100000">
+                                          <p:val>
+                                            <p:strVal val="#ppt_x"/>
+                                          </p:val>
+                                        </p:tav>
+                                      </p:tavLst>
+                                    </p:anim>
+                                    <p:anim calcmode="lin" valueType="num">
+                                      <p:cBhvr additive="base">
+                                        <p:cTn id="8" dur="500" fill="hold"/>
+                                        <p:tgtEl>
+                                          <p:spTgt spid="4"/>
+                                        </p:tgtEl>
+                                        <p:attrNameLst>
+                                          <p:attrName>ppt_y</p:attrName>
+                                        </p:attrNameLst>
+                                      </p:cBhvr>
+                                      <p:tavLst>
+                                        <p:tav tm="0">
+                                          <p:val>
+                                            <p:strVal val="1+#ppt_h/2"/>
+                                          </p:val>
+                                        </p:tav>
+                                        <p:tav tm="100000">
+                                          <p:val>
+                                            <p:strVal val="#ppt_y"/>
+                                          </p:val>
+                                        </p:tav>
+                                      </p:tavLst>
+                                    </p:anim>
+                                  </p:childTnLst>
+                                </p:cTn>
+                              </p:par>
+                            </p:childTnLst>
+                          </p:cTn>
+                        </p:par>
+                      </p:childTnLst>
+                    </p:cTn>
+                  </p:par>
+                </p:childTnLst>
+              </p:cTn>
+              <p:prevCondLst>
+                <p:cond evt="onPrev" delay="0">
+                  <p:tgtEl>
+                    <p:sldTgt/>
+                  </p:tgtEl>
+                </p:cond>
+              </p:prevCondLst>
+              <p:nextCondLst>
+                <p:cond evt="onNext" delay="0">
+                  <p:tgtEl>
+                    <p:sldTgt/>
+                  </p:tgtEl>
+                </p:cond>
+              </p:nextCondLst>
+            </p:seq>
+          </p:childTnLst>
+        </p:cTn>
       </p:par>
     </p:tnLst>
+    <p:bldLst>
+      <p:bldP spid="4" grpId="0" animBg="1"/>
+    </p:bldLst>
   </p:timing>
 </p:sld>
 </file>
@@ -6316,51 +6463,127 @@
             <p:ph type="title"/>
           </p:nvPr>
         </p:nvSpPr>
-        <p:spPr/>
-        <p:txBody>
-          <a:bodyPr/>
-          <a:lstStyle/>
-          <a:p>
-            <a:r>
-              <a:rPr lang="en-US" dirty="0" smtClean="0"/>
-              <a:t>What does this visualization tell us?</a:t>
-            </a:r>
-            <a:endParaRPr lang="en-US" dirty="0"/>
-          </a:p>
-        </p:txBody>
-      </p:sp>
-      <p:sp>
-        <p:nvSpPr>
-          <p:cNvPr id="3" name="Content Placeholder 2"/>
-          <p:cNvSpPr>
-            <a:spLocks noGrp="1"/>
-          </p:cNvSpPr>
-          <p:nvPr>
-            <p:ph sz="quarter" idx="1"/>
-          </p:nvPr>
-        </p:nvSpPr>
-        <p:spPr/>
-        <p:txBody>
-          <a:bodyPr/>
-          <a:lstStyle/>
-          <a:p>
-            <a:r>
-              <a:rPr lang="en-US" dirty="0" smtClean="0"/>
-              <a:t>Some outliers go away when we control for population size (esp. by employee population, by industry sector) but some do not.</a:t>
-            </a:r>
-          </a:p>
-          <a:p>
-            <a:r>
-              <a:rPr lang="en-US" dirty="0" smtClean="0"/>
-              <a:t>Interesting case of California vs. Texas – difference in labor laws, politics, workers’ compensation policies.</a:t>
-            </a:r>
-          </a:p>
-          <a:p>
-            <a:r>
-              <a:rPr lang="en-US" dirty="0" smtClean="0"/>
-              <a:t>What will the new reporting data tell us?</a:t>
-            </a:r>
-            <a:endParaRPr lang="en-US" dirty="0"/>
+        <p:spPr>
+          <a:xfrm>
+            <a:off x="301752" y="228599"/>
+            <a:ext cx="8534400" cy="963073"/>
+          </a:xfrm>
+        </p:spPr>
+        <p:txBody>
+          <a:bodyPr>
+            <a:normAutofit fontScale="90000"/>
+          </a:bodyPr>
+          <a:lstStyle/>
+          <a:p>
+            <a:r>
+              <a:rPr lang="en-US" b="1" dirty="0" smtClean="0"/>
+              <a:t>Geographic dispersion of </a:t>
+            </a:r>
+            <a:br>
+              <a:rPr lang="en-US" b="1" dirty="0" smtClean="0"/>
+            </a:br>
+            <a:r>
+              <a:rPr lang="en-US" b="1" dirty="0" smtClean="0"/>
+              <a:t>workplace fatalities and catastrophes</a:t>
+            </a:r>
+            <a:endParaRPr lang="en-US" b="1" dirty="0"/>
+          </a:p>
+        </p:txBody>
+      </p:sp>
+      <p:pic>
+        <p:nvPicPr>
+          <p:cNvPr id="5" name="Picture 4"/>
+          <p:cNvPicPr>
+            <a:picLocks noChangeAspect="1"/>
+          </p:cNvPicPr>
+          <p:nvPr/>
+        </p:nvPicPr>
+        <p:blipFill>
+          <a:blip r:embed="rId2"/>
+          <a:stretch>
+            <a:fillRect/>
+          </a:stretch>
+        </p:blipFill>
+        <p:spPr>
+          <a:xfrm>
+            <a:off x="992797" y="1570337"/>
+            <a:ext cx="7145020" cy="4611116"/>
+          </a:xfrm>
+          <a:prstGeom prst="rect">
+            <a:avLst/>
+          </a:prstGeom>
+        </p:spPr>
+      </p:pic>
+      <p:sp>
+        <p:nvSpPr>
+          <p:cNvPr id="4" name="TextBox 3"/>
+          <p:cNvSpPr txBox="1"/>
+          <p:nvPr/>
+        </p:nvSpPr>
+        <p:spPr>
+          <a:xfrm>
+            <a:off x="4833604" y="3071036"/>
+            <a:ext cx="4002548" cy="1938992"/>
+          </a:xfrm>
+          <a:prstGeom prst="rect">
+            <a:avLst/>
+          </a:prstGeom>
+          <a:solidFill>
+            <a:schemeClr val="bg1">
+              <a:alpha val="85000"/>
+            </a:schemeClr>
+          </a:solidFill>
+          <a:effectLst>
+            <a:outerShdw blurRad="50800" dist="38100" dir="2700000" algn="tl" rotWithShape="0">
+              <a:srgbClr val="000000">
+                <a:alpha val="43000"/>
+              </a:srgbClr>
+            </a:outerShdw>
+          </a:effectLst>
+        </p:spPr>
+        <p:txBody>
+          <a:bodyPr wrap="square" rtlCol="0">
+            <a:spAutoFit/>
+          </a:bodyPr>
+          <a:lstStyle/>
+          <a:p>
+            <a:pPr>
+              <a:buFont typeface="Symbol" charset="2"/>
+              <a:buChar char=""/>
+            </a:pPr>
+            <a:r>
+              <a:rPr lang="en-US" sz="2000" dirty="0" smtClean="0"/>
+              <a:t>When we exclude the California data, Texas begins to stand out. </a:t>
+            </a:r>
+          </a:p>
+          <a:p>
+            <a:pPr>
+              <a:buFont typeface="Symbol" charset="2"/>
+              <a:buChar char=""/>
+            </a:pPr>
+            <a:r>
+              <a:rPr lang="en-US" sz="2000" dirty="0" smtClean="0"/>
+              <a:t>Difference in labor </a:t>
+            </a:r>
+            <a:r>
+              <a:rPr lang="en-US" sz="2000" dirty="0"/>
+              <a:t>laws, politics, workers’ </a:t>
+            </a:r>
+            <a:r>
+              <a:rPr lang="en-US" sz="2000" dirty="0" smtClean="0"/>
+              <a:t>comp.</a:t>
+            </a:r>
+            <a:endParaRPr lang="en-US" sz="2000" dirty="0"/>
+          </a:p>
+          <a:p>
+            <a:pPr>
+              <a:buFont typeface="Symbol" charset="2"/>
+              <a:buChar char=""/>
+            </a:pPr>
+            <a:r>
+              <a:rPr lang="en-US" sz="2000" dirty="0" smtClean="0"/>
+              <a:t>Underreporting? Could check by comparing to BLS fatality data.</a:t>
+            </a:r>
           </a:p>
         </p:txBody>
       </p:sp>
@@ -6372,9 +6595,126 @@
   <p:timing>
     <p:tnLst>
       <p:par>
-        <p:cTn id="1" dur="indefinite" restart="never" nodeType="tmRoot"/>
+        <p:cTn id="1" dur="indefinite" restart="never" nodeType="tmRoot">
+          <p:childTnLst>
+            <p:seq concurrent="1" nextAc="seek">
+              <p:cTn id="2" dur="indefinite" nodeType="mainSeq">
+                <p:childTnLst>
+                  <p:par>
+                    <p:cTn id="3" fill="hold">
+                      <p:stCondLst>
+                        <p:cond delay="indefinite"/>
+                      </p:stCondLst>
+                      <p:childTnLst>
+                        <p:par>
+                          <p:cTn id="4" fill="hold">
+                            <p:stCondLst>
+                              <p:cond delay="0"/>
+                            </p:stCondLst>
+                            <p:childTnLst>
+                              <p:par>
+                                <p:cTn id="5" presetID="2" presetClass="entr" presetSubtype="4" fill="hold" grpId="0" nodeType="clickEffect">
+                                  <p:stCondLst>
+                                    <p:cond delay="0"/>
+                                  </p:stCondLst>
+                                  <p:childTnLst>
+                                    <p:set>
+                                      <p:cBhvr>
+                                        <p:cTn id="6" dur="1" fill="hold">
+                                          <p:stCondLst>
+                                            <p:cond delay="0"/>
+                                          </p:stCondLst>
+                                        </p:cTn>
+                                        <p:tgtEl>
+                                          <p:spTgt spid="4"/>
+                                        </p:tgtEl>
+                                        <p:attrNameLst>
+                                          <p:attrName>style.visibility</p:attrName>
+                                        </p:attrNameLst>
+                                      </p:cBhvr>
+                                      <p:to>
+                                        <p:strVal val="visible"/>
+                                      </p:to>
+                                    </p:set>
+                                    <p:anim calcmode="lin" valueType="num">
+                                      <p:cBhvr additive="base">
+                                        <p:cTn id="7" dur="500" fill="hold"/>
+                                        <p:tgtEl>
+                                          <p:spTgt spid="4"/>
+                                        </p:tgtEl>
+                                        <p:attrNameLst>
+                                          <p:attrName>ppt_x</p:attrName>
+                                        </p:attrNameLst>
+                                      </p:cBhvr>
+                                      <p:tavLst>
+                                        <p:tav tm="0">
+                                          <p:val>
+                                            <p:strVal val="#ppt_x"/>
+                                          </p:val>
+                                        </p:tav>
+                                        <p:tav tm="100000">
+                                          <p:val>
+                                            <p:strVal val="#ppt_x"/>
+                                          </p:val>
+                                        </p:tav>
+                                      </p:tavLst>
+                                    </p:anim>
+                                    <p:anim calcmode="lin" valueType="num">
+                                      <p:cBhvr additive="base">
+                                        <p:cTn id="8" dur="500" fill="hold"/>
+                                        <p:tgtEl>
+                                          <p:spTgt spid="4"/>
+                                        </p:tgtEl>
+                                        <p:attrNameLst>
+                                          <p:attrName>ppt_y</p:attrName>
+                                        </p:attrNameLst>
+                                      </p:cBhvr>
+                                      <p:tavLst>
+                                        <p:tav tm="0">
+                                          <p:val>
+                                            <p:strVal val="1+#ppt_h/2"/>
+                                          </p:val>
+                                        </p:tav>
+                                        <p:tav tm="100000">
+                                          <p:val>
+                                            <p:strVal val="#ppt_y"/>
+                                          </p:val>
+                                        </p:tav>
+                                      </p:tavLst>
+                                    </p:anim>
+                                  </p:childTnLst>
+                                </p:cTn>
+                              </p:par>
+                            </p:childTnLst>
+                          </p:cTn>
+                        </p:par>
+                      </p:childTnLst>
+                    </p:cTn>
+                  </p:par>
+                </p:childTnLst>
+              </p:cTn>
+              <p:prevCondLst>
+                <p:cond evt="onPrev" delay="0">
+                  <p:tgtEl>
+                    <p:sldTgt/>
+                  </p:tgtEl>
+                </p:cond>
+              </p:prevCondLst>
+              <p:nextCondLst>
+                <p:cond evt="onNext" delay="0">
+                  <p:tgtEl>
+                    <p:sldTgt/>
+                  </p:tgtEl>
+                </p:cond>
+              </p:nextCondLst>
+            </p:seq>
+          </p:childTnLst>
+        </p:cTn>
       </p:par>
     </p:tnLst>
+    <p:bldLst>
+      <p:bldP spid="4" grpId="0" animBg="1"/>
+    </p:bldLst>
   </p:timing>
 </p:sld>
 </file>
@@ -6412,14 +6752,10 @@
           <a:lstStyle/>
           <a:p>
             <a:r>
-              <a:rPr lang="en-US" dirty="0" smtClean="0"/>
-              <a:t>Join us in exploring OSHA’s </a:t>
-            </a:r>
-            <a:r>
-              <a:rPr lang="en-US" dirty="0" smtClean="0"/>
-              <a:t>datasets!</a:t>
-            </a:r>
-            <a:endParaRPr lang="en-US" dirty="0"/>
+              <a:rPr lang="en-US" b="1" dirty="0" smtClean="0"/>
+              <a:t>What’s next?</a:t>
+            </a:r>
+            <a:endParaRPr lang="en-US" b="1" dirty="0"/>
           </a:p>
         </p:txBody>
       </p:sp>
@@ -6439,6 +6775,104 @@
           <a:lstStyle/>
           <a:p>
             <a:r>
+              <a:rPr lang="en-US" dirty="0" smtClean="0"/>
+              <a:t>Time-series animations: Deeper study of geographic migration in fatal and </a:t>
+            </a:r>
+            <a:r>
+              <a:rPr lang="en-US" dirty="0" smtClean="0"/>
+              <a:t>catastrophic </a:t>
+            </a:r>
+            <a:r>
+              <a:rPr lang="en-US" dirty="0" smtClean="0"/>
+              <a:t>workplace events over time.</a:t>
+            </a:r>
+          </a:p>
+          <a:p>
+            <a:r>
+              <a:rPr lang="en-US" dirty="0" smtClean="0"/>
+              <a:t>Predictive analytics: Can we predict future incidents?</a:t>
+            </a:r>
+          </a:p>
+          <a:p>
+            <a:r>
+              <a:rPr lang="en-US" dirty="0" smtClean="0"/>
+              <a:t>A LOT more data: What will we learn from the new reporting data (not just fatalities/catastrophes but all serious work-related injuries, illnesses, and hospitalizations)?</a:t>
+            </a:r>
+            <a:endParaRPr lang="en-US" dirty="0"/>
+          </a:p>
+        </p:txBody>
+      </p:sp>
+    </p:spTree>
+  </p:cSld>
+  <p:clrMapOvr>
+    <a:masterClrMapping/>
+  </p:clrMapOvr>
+  <p:timing>
+    <p:tnLst>
+      <p:par>
+        <p:cTn id="1" dur="indefinite" restart="never" nodeType="tmRoot"/>
+      </p:par>
+    </p:tnLst>
+  </p:timing>
+</p:sld>
+</file>
+
+<file path=ppt/slides/slide13.xml><?xml version="1.0" encoding="utf-8"?>
+<p:sld xmlns:a="http://schemas.openxmlformats.org/drawingml/2006/main" xmlns:r="http://schemas.openxmlformats.org/officeDocument/2006/relationships" xmlns:mc="http://schemas.openxmlformats.org/markup-compatibility/2006" xmlns:mv="urn:schemas-microsoft-com:mac:vml" xmlns:p="http://schemas.openxmlformats.org/presentationml/2006/main" mc:Ignorable="mv" mc:PreserveAttributes="mv:*">
+  <p:cSld>
+    <p:spTree>
+      <p:nvGrpSpPr>
+        <p:cNvPr id="1" name=""/>
+        <p:cNvGrpSpPr/>
+        <p:nvPr/>
+      </p:nvGrpSpPr>
+      <p:grpSpPr>
+        <a:xfrm>
+          <a:off x="0" y="0"/>
+          <a:ext cx="0" cy="0"/>
+          <a:chOff x="0" y="0"/>
+          <a:chExt cx="0" cy="0"/>
+        </a:xfrm>
+      </p:grpSpPr>
+      <p:sp>
+        <p:nvSpPr>
+          <p:cNvPr id="2" name="Title 1"/>
+          <p:cNvSpPr>
+            <a:spLocks noGrp="1"/>
+          </p:cNvSpPr>
+          <p:nvPr>
+            <p:ph type="title"/>
+          </p:nvPr>
+        </p:nvSpPr>
+        <p:spPr/>
+        <p:txBody>
+          <a:bodyPr/>
+          <a:lstStyle/>
+          <a:p>
+            <a:r>
+              <a:rPr lang="en-US" b="1" dirty="0" smtClean="0"/>
+              <a:t>Join us in exploring OSHA’s datasets!</a:t>
+            </a:r>
+            <a:endParaRPr lang="en-US" b="1" dirty="0"/>
+          </a:p>
+        </p:txBody>
+      </p:sp>
+      <p:sp>
+        <p:nvSpPr>
+          <p:cNvPr id="3" name="Content Placeholder 2"/>
+          <p:cNvSpPr>
+            <a:spLocks noGrp="1"/>
+          </p:cNvSpPr>
+          <p:nvPr>
+            <p:ph sz="quarter" idx="1"/>
+          </p:nvPr>
+        </p:nvSpPr>
+        <p:spPr/>
+        <p:txBody>
+          <a:bodyPr/>
+          <a:lstStyle/>
+          <a:p>
+            <a:r>
               <a:rPr lang="en-US" dirty="0" err="1" smtClean="0"/>
               <a:t>GitHub</a:t>
             </a:r>
@@ -6448,11 +6882,7 @@
             <a:pPr lvl="1"/>
             <a:r>
               <a:rPr lang="en-US" dirty="0" smtClean="0"/>
-              <a:t>Python ingestion and</a:t>
-            </a:r>
-            <a:r>
-              <a:rPr lang="en-US" dirty="0" smtClean="0"/>
-              <a:t> </a:t>
+              <a:t>Python ingestion and </a:t>
             </a:r>
             <a:r>
               <a:rPr lang="en-US" dirty="0" err="1" smtClean="0"/>
@@ -6460,11 +6890,7 @@
             </a:r>
             <a:r>
               <a:rPr lang="en-US" dirty="0" smtClean="0"/>
-              <a:t> heat </a:t>
-            </a:r>
-            <a:r>
-              <a:rPr lang="en-US" dirty="0" smtClean="0"/>
-              <a:t>map code: </a:t>
+              <a:t> heat map code: </a:t>
             </a:r>
           </a:p>
           <a:p>
@@ -6477,7 +6903,7 @@
             </a:r>
             <a:r>
               <a:rPr lang="en-US" dirty="0" err="1" smtClean="0"/>
-              <a:t>github.com/OSHADataDoor/FatalityMapper</a:t>
+              <a:t>github.com/OSHADataDoor</a:t>
             </a:r>
             <a:endParaRPr lang="en-US" dirty="0" smtClean="0"/>
           </a:p>
@@ -6485,15 +6911,7 @@
             <a:pPr lvl="1"/>
             <a:r>
               <a:rPr lang="en-US" dirty="0" smtClean="0"/>
-              <a:t>Original</a:t>
-            </a:r>
-            <a:r>
-              <a:rPr lang="en-US" dirty="0" smtClean="0"/>
-              <a:t> Georgetown Univ. data </a:t>
-            </a:r>
-            <a:r>
-              <a:rPr lang="en-US" dirty="0" smtClean="0"/>
-              <a:t>analytics capstone project: </a:t>
+              <a:t>Original Georgetown U. data analytics capstone project: </a:t>
             </a:r>
           </a:p>
           <a:p>
@@ -6519,11 +6937,7 @@
           <a:p>
             <a:r>
               <a:rPr lang="en-US" dirty="0" smtClean="0"/>
-              <a:t>Questions? Find us on </a:t>
-            </a:r>
-            <a:r>
-              <a:rPr lang="en-US" dirty="0" smtClean="0"/>
-              <a:t>LinkedIn!</a:t>
+              <a:t>Questions? Find us on LinkedIn!</a:t>
             </a:r>
           </a:p>
           <a:p>
@@ -6604,10 +7018,10 @@
           <a:lstStyle/>
           <a:p>
             <a:r>
-              <a:rPr lang="en-US" dirty="0" smtClean="0"/>
+              <a:rPr lang="en-US" b="1" dirty="0" smtClean="0"/>
               <a:t>OSH Act of 1970</a:t>
             </a:r>
-            <a:endParaRPr lang="en-US" dirty="0"/>
+            <a:endParaRPr lang="en-US" b="1" dirty="0"/>
           </a:p>
         </p:txBody>
       </p:sp>
@@ -6702,10 +7116,10 @@
           <a:lstStyle/>
           <a:p>
             <a:r>
-              <a:rPr lang="en-US" dirty="0" smtClean="0"/>
+              <a:rPr lang="en-US" b="1" dirty="0" smtClean="0"/>
               <a:t>Asking questions with data</a:t>
             </a:r>
-            <a:endParaRPr lang="en-US" dirty="0"/>
+            <a:endParaRPr lang="en-US" b="1" dirty="0"/>
           </a:p>
         </p:txBody>
       </p:sp>
@@ -6810,10 +7224,10 @@
           <a:lstStyle/>
           <a:p>
             <a:r>
-              <a:rPr lang="en-US" dirty="0" smtClean="0"/>
+              <a:rPr lang="en-US" b="1" dirty="0" smtClean="0"/>
               <a:t>Getting into data science</a:t>
             </a:r>
-            <a:endParaRPr lang="en-US" dirty="0"/>
+            <a:endParaRPr lang="en-US" b="1" dirty="0"/>
           </a:p>
         </p:txBody>
       </p:sp>
@@ -6829,84 +7243,54 @@
         </p:nvSpPr>
         <p:spPr/>
         <p:txBody>
-          <a:bodyPr/>
+          <a:bodyPr>
+            <a:normAutofit/>
+          </a:bodyPr>
           <a:lstStyle/>
           <a:p>
             <a:r>
               <a:rPr lang="en-US" dirty="0" smtClean="0"/>
-              <a:t>Georgetown Data Analytics Certificate Program</a:t>
+              <a:t>Georgetown Data Analytics Certificate Program – Cohort 2</a:t>
             </a:r>
           </a:p>
           <a:p>
             <a:r>
               <a:rPr lang="en-US" dirty="0" smtClean="0"/>
-              <a:t>Python experimentation: </a:t>
-            </a:r>
-            <a:r>
-              <a:rPr lang="en-US" dirty="0" err="1" smtClean="0"/>
-              <a:t>BeautifulSoup</a:t>
-            </a:r>
+              <a:t>Challenges of getting into data science</a:t>
+            </a:r>
+          </a:p>
+          <a:p>
             <a:r>
               <a:rPr lang="en-US" dirty="0" smtClean="0"/>
-              <a:t>, Pandas, </a:t>
-            </a:r>
-            <a:r>
-              <a:rPr lang="en-US" dirty="0" err="1" smtClean="0"/>
-              <a:t>NumPy</a:t>
-            </a:r>
+              <a:t>What you need to get started:</a:t>
+            </a:r>
+          </a:p>
+          <a:p>
+            <a:pPr lvl="1"/>
             <a:r>
               <a:rPr lang="en-US" dirty="0" smtClean="0"/>
-              <a:t>, Pearson, </a:t>
-            </a:r>
-            <a:r>
-              <a:rPr lang="en-US" dirty="0" err="1" smtClean="0"/>
-              <a:t>MatPlotLib</a:t>
-            </a:r>
+              <a:t>Some programming</a:t>
+            </a:r>
+          </a:p>
+          <a:p>
+            <a:pPr lvl="1"/>
             <a:r>
               <a:rPr lang="en-US" dirty="0" smtClean="0"/>
-              <a:t>, </a:t>
-            </a:r>
-            <a:r>
-              <a:rPr lang="en-US" dirty="0" err="1" smtClean="0"/>
-              <a:t>iPython</a:t>
-            </a:r>
+              <a:t>Some statistics</a:t>
+            </a:r>
+          </a:p>
+          <a:p>
+            <a:pPr lvl="1"/>
             <a:r>
               <a:rPr lang="en-US" dirty="0" smtClean="0"/>
-              <a:t> Notebook</a:t>
-            </a:r>
-          </a:p>
-          <a:p>
+              <a:t>A visual eye</a:t>
+            </a:r>
+          </a:p>
+          <a:p>
+            <a:pPr lvl="1"/>
             <a:r>
               <a:rPr lang="en-US" dirty="0" smtClean="0"/>
-              <a:t>Hypothesis-generation: exploring relationships between OSHA dataset and </a:t>
-            </a:r>
-          </a:p>
-          <a:p>
-            <a:pPr lvl="1"/>
-            <a:r>
-              <a:rPr lang="en-US" dirty="0" smtClean="0"/>
-              <a:t>seasonality</a:t>
-            </a:r>
-          </a:p>
-          <a:p>
-            <a:pPr lvl="1"/>
-            <a:r>
-              <a:rPr lang="en-US" dirty="0" smtClean="0"/>
-              <a:t>industry (SIC) codes</a:t>
-            </a:r>
-          </a:p>
-          <a:p>
-            <a:pPr lvl="1"/>
-            <a:r>
-              <a:rPr lang="en-US" dirty="0" smtClean="0"/>
-              <a:t>unemployment rate</a:t>
-            </a:r>
-          </a:p>
-          <a:p>
-            <a:pPr lvl="1"/>
-            <a:r>
-              <a:rPr lang="en-US" dirty="0" smtClean="0"/>
-              <a:t>geography</a:t>
+              <a:t>Persistence!</a:t>
             </a:r>
           </a:p>
           <a:p>
@@ -6931,7 +7315,82 @@
   <p:timing>
     <p:tnLst>
       <p:par>
-        <p:cTn id="1" dur="indefinite" restart="never" nodeType="tmRoot"/>
+        <p:cTn id="1" dur="indefinite" restart="never" nodeType="tmRoot">
+          <p:childTnLst>
+            <p:seq concurrent="1" nextAc="seek">
+              <p:cTn id="2" dur="indefinite" nodeType="mainSeq">
+                <p:childTnLst>
+                  <p:par>
+                    <p:cTn id="3" fill="hold">
+                      <p:stCondLst>
+                        <p:cond delay="indefinite"/>
+                      </p:stCondLst>
+                      <p:childTnLst>
+                        <p:par>
+                          <p:cTn id="4" fill="hold">
+                            <p:stCondLst>
+                              <p:cond delay="0"/>
+                            </p:stCondLst>
+                            <p:childTnLst>
+                              <p:par>
+                                <p:cTn id="5" presetID="26" presetClass="emph" presetSubtype="0" fill="hold" nodeType="clickEffect">
+                                  <p:stCondLst>
+                                    <p:cond delay="0"/>
+                                  </p:stCondLst>
+                                  <p:childTnLst>
+                                    <p:animEffect transition="out" filter="fade">
+                                      <p:cBhvr>
+                                        <p:cTn id="6" dur="500" tmFilter="0, 0; .2, .5; .8, .5; 1, 0"/>
+                                        <p:tgtEl>
+                                          <p:spTgt spid="3">
+                                            <p:txEl>
+                                              <p:pRg st="6" end="6"/>
+                                            </p:txEl>
+                                          </p:spTgt>
+                                        </p:tgtEl>
+                                      </p:cBhvr>
+                                    </p:animEffect>
+                                    <p:animScale>
+                                      <p:cBhvr>
+                                        <p:cTn id="7" dur="250" autoRev="1" fill="hold"/>
+                                        <p:tgtEl>
+                                          <p:spTgt spid="3">
+                                            <p:txEl>
+                                              <p:pRg st="6" end="6"/>
+                                            </p:txEl>
+                                          </p:spTgt>
+                                        </p:tgtEl>
+                                      </p:cBhvr>
+                                      <p:by x="105000" y="105000"/>
+                                    </p:animScale>
+                                  </p:childTnLst>
+                                </p:cTn>
+                              </p:par>
+                            </p:childTnLst>
+                          </p:cTn>
+                        </p:par>
+                      </p:childTnLst>
+                    </p:cTn>
+                  </p:par>
+                </p:childTnLst>
+              </p:cTn>
+              <p:prevCondLst>
+                <p:cond evt="onPrev" delay="0">
+                  <p:tgtEl>
+                    <p:sldTgt/>
+                  </p:tgtEl>
+                </p:cond>
+              </p:prevCondLst>
+              <p:nextCondLst>
+                <p:cond evt="onNext" delay="0">
+                  <p:tgtEl>
+                    <p:sldTgt/>
+                  </p:tgtEl>
+                </p:cond>
+              </p:nextCondLst>
+            </p:seq>
+          </p:childTnLst>
+        </p:cTn>
       </p:par>
     </p:tnLst>
   </p:timing>
@@ -6971,32 +7430,139 @@
           <a:lstStyle/>
           <a:p>
             <a:r>
-              <a:rPr lang="en-US" dirty="0" smtClean="0"/>
-              <a:t>Preliminary findings</a:t>
-            </a:r>
-            <a:endParaRPr lang="en-US" dirty="0"/>
-          </a:p>
-        </p:txBody>
-      </p:sp>
-      <p:pic>
-        <p:nvPicPr>
-          <p:cNvPr id="4" name="Content Placeholder 3" descr="oJZmnzwAAAABJRU5ErkJggg==.png"/>
-          <p:cNvPicPr>
-            <a:picLocks noGrp="1" noChangeAspect="1"/>
-          </p:cNvPicPr>
+              <a:rPr lang="en-US" b="1" dirty="0" smtClean="0"/>
+              <a:t>Getting into data science</a:t>
+            </a:r>
+            <a:endParaRPr lang="en-US" b="1" dirty="0"/>
+          </a:p>
+        </p:txBody>
+      </p:sp>
+      <p:sp>
+        <p:nvSpPr>
+          <p:cNvPr id="3" name="Content Placeholder 2"/>
+          <p:cNvSpPr>
+            <a:spLocks noGrp="1"/>
+          </p:cNvSpPr>
           <p:nvPr>
             <p:ph sz="quarter" idx="1"/>
           </p:nvPr>
-        </p:nvPicPr>
-        <p:blipFill>
-          <a:blip r:embed="rId2"/>
-          <a:srcRect l="-11481" r="-11481"/>
-          <a:stretch>
-            <a:fillRect/>
-          </a:stretch>
-        </p:blipFill>
+        </p:nvSpPr>
         <p:spPr/>
-      </p:pic>
+        <p:txBody>
+          <a:bodyPr>
+            <a:normAutofit/>
+          </a:bodyPr>
+          <a:lstStyle/>
+          <a:p>
+            <a:r>
+              <a:rPr lang="en-US" dirty="0" smtClean="0"/>
+              <a:t>Python experimentation: </a:t>
+            </a:r>
+            <a:r>
+              <a:rPr lang="en-US" dirty="0" err="1" smtClean="0"/>
+              <a:t>BeautifulSoup</a:t>
+            </a:r>
+            <a:r>
+              <a:rPr lang="en-US" dirty="0" smtClean="0"/>
+              <a:t>, Requests, Pandas, </a:t>
+            </a:r>
+            <a:r>
+              <a:rPr lang="en-US" dirty="0" err="1" smtClean="0"/>
+              <a:t>NumPy</a:t>
+            </a:r>
+            <a:r>
+              <a:rPr lang="en-US" dirty="0" smtClean="0"/>
+              <a:t>, </a:t>
+            </a:r>
+            <a:r>
+              <a:rPr lang="en-US" dirty="0" err="1" smtClean="0"/>
+              <a:t>PearsonR</a:t>
+            </a:r>
+            <a:r>
+              <a:rPr lang="en-US" dirty="0" smtClean="0"/>
+              <a:t>, </a:t>
+            </a:r>
+            <a:r>
+              <a:rPr lang="en-US" dirty="0" err="1" smtClean="0"/>
+              <a:t>MatPlotLib</a:t>
+            </a:r>
+            <a:r>
+              <a:rPr lang="en-US" dirty="0" smtClean="0"/>
+              <a:t>, </a:t>
+            </a:r>
+            <a:r>
+              <a:rPr lang="en-US" dirty="0" err="1" smtClean="0"/>
+              <a:t>iPython</a:t>
+            </a:r>
+            <a:r>
+              <a:rPr lang="en-US" dirty="0" smtClean="0"/>
+              <a:t> Notebook, </a:t>
+            </a:r>
+            <a:r>
+              <a:rPr lang="en-US" dirty="0" err="1" smtClean="0"/>
+              <a:t>Bokeh</a:t>
+            </a:r>
+            <a:endParaRPr lang="en-US" dirty="0" smtClean="0"/>
+          </a:p>
+          <a:p>
+            <a:r>
+              <a:rPr lang="en-US" dirty="0" smtClean="0"/>
+              <a:t>Teamwork: </a:t>
+            </a:r>
+            <a:r>
+              <a:rPr lang="en-US" dirty="0" err="1" smtClean="0"/>
+              <a:t>GitHub</a:t>
+            </a:r>
+            <a:endParaRPr lang="en-US" dirty="0" smtClean="0"/>
+          </a:p>
+          <a:p>
+            <a:r>
+              <a:rPr lang="en-US" dirty="0" smtClean="0"/>
+              <a:t>Hypothesis-testing with OSHA data and:</a:t>
+            </a:r>
+          </a:p>
+          <a:p>
+            <a:pPr lvl="1"/>
+            <a:r>
+              <a:rPr lang="en-US" dirty="0" smtClean="0"/>
+              <a:t>seasonality</a:t>
+            </a:r>
+          </a:p>
+          <a:p>
+            <a:pPr lvl="1"/>
+            <a:r>
+              <a:rPr lang="en-US" dirty="0" smtClean="0"/>
+              <a:t>industry (SIC) codes</a:t>
+            </a:r>
+          </a:p>
+          <a:p>
+            <a:pPr lvl="1"/>
+            <a:r>
+              <a:rPr lang="en-US" dirty="0" smtClean="0"/>
+              <a:t>unemployment rates</a:t>
+            </a:r>
+          </a:p>
+          <a:p>
+            <a:pPr lvl="1"/>
+            <a:r>
+              <a:rPr lang="en-US" dirty="0" smtClean="0"/>
+              <a:t>geography</a:t>
+            </a:r>
+          </a:p>
+          <a:p>
+            <a:endParaRPr lang="en-US" dirty="0" smtClean="0"/>
+          </a:p>
+          <a:p>
+            <a:endParaRPr lang="en-US" dirty="0" smtClean="0"/>
+          </a:p>
+          <a:p>
+            <a:endParaRPr lang="en-US" dirty="0" smtClean="0"/>
+          </a:p>
+          <a:p>
+            <a:endParaRPr lang="en-US" dirty="0"/>
+          </a:p>
+        </p:txBody>
+      </p:sp>
     </p:spTree>
   </p:cSld>
   <p:clrMapOvr>
@@ -7045,37 +7611,81 @@
           <a:lstStyle/>
           <a:p>
             <a:r>
-              <a:rPr lang="en-US" dirty="0" smtClean="0"/>
+              <a:rPr lang="en-US" b="1" dirty="0" smtClean="0"/>
               <a:t>Preliminary findings</a:t>
             </a:r>
-            <a:endParaRPr lang="en-US" dirty="0"/>
+            <a:endParaRPr lang="en-US" b="1" dirty="0"/>
           </a:p>
         </p:txBody>
       </p:sp>
       <p:pic>
         <p:nvPicPr>
-          <p:cNvPr id="4" name="Content Placeholder 3" descr="+Fx2N8v8cGl0PAAAAAElFTkSuQmCC.png"/>
+          <p:cNvPr id="5" name="Picture 4"/>
           <p:cNvPicPr>
-            <a:picLocks noGrp="1" noChangeAspect="1"/>
+            <a:picLocks noChangeAspect="1"/>
           </p:cNvPicPr>
-          <p:nvPr>
-            <p:ph sz="quarter" idx="1"/>
-          </p:nvPr>
+          <p:nvPr/>
         </p:nvPicPr>
         <p:blipFill>
           <a:blip r:embed="rId2"/>
-          <a:srcRect l="-9914" r="-9914"/>
           <a:stretch>
             <a:fillRect/>
           </a:stretch>
         </p:blipFill>
         <p:spPr>
           <a:xfrm>
-            <a:off x="-611150" y="1527047"/>
-            <a:ext cx="10089361" cy="5424387"/>
-          </a:xfrm>
+            <a:off x="1439243" y="1528570"/>
+            <a:ext cx="6261100" cy="4765802"/>
+          </a:xfrm>
+          <a:prstGeom prst="rect">
+            <a:avLst/>
+          </a:prstGeom>
         </p:spPr>
       </p:pic>
+      <p:sp>
+        <p:nvSpPr>
+          <p:cNvPr id="4" name="TextBox 3"/>
+          <p:cNvSpPr txBox="1"/>
+          <p:nvPr/>
+        </p:nvSpPr>
+        <p:spPr>
+          <a:xfrm>
+            <a:off x="4833604" y="3071036"/>
+            <a:ext cx="4002548" cy="1015663"/>
+          </a:xfrm>
+          <a:prstGeom prst="rect">
+            <a:avLst/>
+          </a:prstGeom>
+          <a:solidFill>
+            <a:schemeClr val="bg1">
+              <a:alpha val="85000"/>
+            </a:schemeClr>
+          </a:solidFill>
+          <a:effectLst>
+            <a:outerShdw blurRad="50800" dist="38100" dir="2700000" algn="tl" rotWithShape="0">
+              <a:srgbClr val="000000">
+                <a:alpha val="43000"/>
+              </a:srgbClr>
+            </a:outerShdw>
+          </a:effectLst>
+        </p:spPr>
+        <p:txBody>
+          <a:bodyPr wrap="square" rtlCol="0">
+            <a:spAutoFit/>
+          </a:bodyPr>
+          <a:lstStyle/>
+          <a:p>
+            <a:pPr>
+              <a:buFont typeface="Symbol" charset="2"/>
+              <a:buChar char=""/>
+            </a:pPr>
+            <a:r>
+              <a:rPr lang="en-US" sz="2000" dirty="0" smtClean="0"/>
+              <a:t>There’s an inverse correlation between unemployment and construction activity.</a:t>
+            </a:r>
+          </a:p>
+        </p:txBody>
+      </p:sp>
     </p:spTree>
   </p:cSld>
   <p:clrMapOvr>
@@ -7084,9 +7694,126 @@
   <p:timing>
     <p:tnLst>
       <p:par>
-        <p:cTn id="1" dur="indefinite" restart="never" nodeType="tmRoot"/>
+        <p:cTn id="1" dur="indefinite" restart="never" nodeType="tmRoot">
+          <p:childTnLst>
+            <p:seq concurrent="1" nextAc="seek">
+              <p:cTn id="2" dur="indefinite" nodeType="mainSeq">
+                <p:childTnLst>
+                  <p:par>
+                    <p:cTn id="3" fill="hold">
+                      <p:stCondLst>
+                        <p:cond delay="indefinite"/>
+                      </p:stCondLst>
+                      <p:childTnLst>
+                        <p:par>
+                          <p:cTn id="4" fill="hold">
+                            <p:stCondLst>
+                              <p:cond delay="0"/>
+                            </p:stCondLst>
+                            <p:childTnLst>
+                              <p:par>
+                                <p:cTn id="5" presetID="2" presetClass="entr" presetSubtype="4" fill="hold" grpId="0" nodeType="clickEffect">
+                                  <p:stCondLst>
+                                    <p:cond delay="0"/>
+                                  </p:stCondLst>
+                                  <p:childTnLst>
+                                    <p:set>
+                                      <p:cBhvr>
+                                        <p:cTn id="6" dur="1" fill="hold">
+                                          <p:stCondLst>
+                                            <p:cond delay="0"/>
+                                          </p:stCondLst>
+                                        </p:cTn>
+                                        <p:tgtEl>
+                                          <p:spTgt spid="4"/>
+                                        </p:tgtEl>
+                                        <p:attrNameLst>
+                                          <p:attrName>style.visibility</p:attrName>
+                                        </p:attrNameLst>
+                                      </p:cBhvr>
+                                      <p:to>
+                                        <p:strVal val="visible"/>
+                                      </p:to>
+                                    </p:set>
+                                    <p:anim calcmode="lin" valueType="num">
+                                      <p:cBhvr additive="base">
+                                        <p:cTn id="7" dur="500" fill="hold"/>
+                                        <p:tgtEl>
+                                          <p:spTgt spid="4"/>
+                                        </p:tgtEl>
+                                        <p:attrNameLst>
+                                          <p:attrName>ppt_x</p:attrName>
+                                        </p:attrNameLst>
+                                      </p:cBhvr>
+                                      <p:tavLst>
+                                        <p:tav tm="0">
+                                          <p:val>
+                                            <p:strVal val="#ppt_x"/>
+                                          </p:val>
+                                        </p:tav>
+                                        <p:tav tm="100000">
+                                          <p:val>
+                                            <p:strVal val="#ppt_x"/>
+                                          </p:val>
+                                        </p:tav>
+                                      </p:tavLst>
+                                    </p:anim>
+                                    <p:anim calcmode="lin" valueType="num">
+                                      <p:cBhvr additive="base">
+                                        <p:cTn id="8" dur="500" fill="hold"/>
+                                        <p:tgtEl>
+                                          <p:spTgt spid="4"/>
+                                        </p:tgtEl>
+                                        <p:attrNameLst>
+                                          <p:attrName>ppt_y</p:attrName>
+                                        </p:attrNameLst>
+                                      </p:cBhvr>
+                                      <p:tavLst>
+                                        <p:tav tm="0">
+                                          <p:val>
+                                            <p:strVal val="1+#ppt_h/2"/>
+                                          </p:val>
+                                        </p:tav>
+                                        <p:tav tm="100000">
+                                          <p:val>
+                                            <p:strVal val="#ppt_y"/>
+                                          </p:val>
+                                        </p:tav>
+                                      </p:tavLst>
+                                    </p:anim>
+                                  </p:childTnLst>
+                                </p:cTn>
+                              </p:par>
+                            </p:childTnLst>
+                          </p:cTn>
+                        </p:par>
+                      </p:childTnLst>
+                    </p:cTn>
+                  </p:par>
+                </p:childTnLst>
+              </p:cTn>
+              <p:prevCondLst>
+                <p:cond evt="onPrev" delay="0">
+                  <p:tgtEl>
+                    <p:sldTgt/>
+                  </p:tgtEl>
+                </p:cond>
+              </p:prevCondLst>
+              <p:nextCondLst>
+                <p:cond evt="onNext" delay="0">
+                  <p:tgtEl>
+                    <p:sldTgt/>
+                  </p:tgtEl>
+                </p:cond>
+              </p:nextCondLst>
+            </p:seq>
+          </p:childTnLst>
+        </p:cTn>
       </p:par>
     </p:tnLst>
+    <p:bldLst>
+      <p:bldP spid="4" grpId="0" animBg="1"/>
+    </p:bldLst>
   </p:timing>
 </p:sld>
 </file>
@@ -7124,49 +7851,87 @@
           <a:lstStyle/>
           <a:p>
             <a:r>
-              <a:rPr lang="en-US" dirty="0" smtClean="0"/>
+              <a:rPr lang="en-US" b="1" dirty="0" smtClean="0"/>
               <a:t>Preliminary findings</a:t>
             </a:r>
-            <a:endParaRPr lang="en-US" dirty="0"/>
-          </a:p>
-        </p:txBody>
-      </p:sp>
-      <p:sp>
-        <p:nvSpPr>
-          <p:cNvPr id="5" name="Content Placeholder 4"/>
-          <p:cNvSpPr>
-            <a:spLocks noGrp="1"/>
-          </p:cNvSpPr>
-          <p:nvPr>
-            <p:ph sz="quarter" idx="1"/>
-          </p:nvPr>
-        </p:nvSpPr>
-        <p:spPr/>
-        <p:txBody>
-          <a:bodyPr/>
-          <a:lstStyle/>
-          <a:p>
-            <a:r>
-              <a:rPr lang="en-US" dirty="0" smtClean="0"/>
-              <a:t>Employment rates and workplace fatalities are inversely correlated, particularly in the construction sector.</a:t>
-            </a:r>
-          </a:p>
-          <a:p>
-            <a:r>
-              <a:rPr lang="en-US" dirty="0" smtClean="0"/>
-              <a:t>For 1990-2010: increase in fatalities in states just north of Mason-Dixon line correlated with a matching decline in states just south.</a:t>
-            </a:r>
-          </a:p>
-          <a:p>
-            <a:r>
-              <a:rPr lang="en-US" dirty="0" smtClean="0"/>
-              <a:t>Outliers (California, Texas, Oregon, Florida, Maryland) – due merely to larger populations, or something else?</a:t>
-            </a:r>
-            <a:endParaRPr lang="en-US" dirty="0"/>
+            <a:endParaRPr lang="en-US" b="1" dirty="0"/>
+          </a:p>
+        </p:txBody>
+      </p:sp>
+      <p:pic>
+        <p:nvPicPr>
+          <p:cNvPr id="6" name="Picture 5"/>
+          <p:cNvPicPr>
+            <a:picLocks noChangeAspect="1"/>
+          </p:cNvPicPr>
+          <p:nvPr/>
+        </p:nvPicPr>
+        <p:blipFill>
+          <a:blip r:embed="rId2"/>
+          <a:stretch>
+            <a:fillRect/>
+          </a:stretch>
+        </p:blipFill>
+        <p:spPr>
+          <a:xfrm>
+            <a:off x="1299733" y="1562404"/>
+            <a:ext cx="6535674" cy="4752594"/>
+          </a:xfrm>
+          <a:prstGeom prst="rect">
+            <a:avLst/>
+          </a:prstGeom>
+        </p:spPr>
+      </p:pic>
+      <p:sp>
+        <p:nvSpPr>
+          <p:cNvPr id="4" name="TextBox 3"/>
+          <p:cNvSpPr txBox="1"/>
+          <p:nvPr/>
+        </p:nvSpPr>
+        <p:spPr>
+          <a:xfrm>
+            <a:off x="4833604" y="3071036"/>
+            <a:ext cx="4002548" cy="1323439"/>
+          </a:xfrm>
+          <a:prstGeom prst="rect">
+            <a:avLst/>
+          </a:prstGeom>
+          <a:solidFill>
+            <a:schemeClr val="bg1">
+              <a:alpha val="85000"/>
+            </a:schemeClr>
+          </a:solidFill>
+          <a:effectLst>
+            <a:outerShdw blurRad="50800" dist="38100" dir="2700000" algn="tl" rotWithShape="0">
+              <a:srgbClr val="000000">
+                <a:alpha val="43000"/>
+              </a:srgbClr>
+            </a:outerShdw>
+          </a:effectLst>
+        </p:spPr>
+        <p:txBody>
+          <a:bodyPr wrap="square" rtlCol="0">
+            <a:spAutoFit/>
+          </a:bodyPr>
+          <a:lstStyle/>
+          <a:p>
+            <a:pPr>
+              <a:buFont typeface="Symbol" charset="2"/>
+              <a:buChar char=""/>
+            </a:pPr>
+            <a:r>
+              <a:rPr lang="en-US" sz="2000" dirty="0" smtClean="0"/>
+              <a:t>There’s also an inverse correlation between unemployment and workplace fatalities/catastrophes.</a:t>
+            </a:r>
           </a:p>
         </p:txBody>
       </p:sp>
     </p:spTree>
+    <p:extLst>
+      <p:ext uri="{BB962C8B-B14F-4D97-AF65-F5344CB8AC3E}">
+        <p14:creationId xmlns:p14="http://schemas.microsoft.com/office/powerpoint/2010/main" xmlns:p="http://schemas.openxmlformats.org/presentationml/2006/main" xmlns:r="http://schemas.openxmlformats.org/officeDocument/2006/relationships" xmlns:a="http://schemas.openxmlformats.org/drawingml/2006/main" xmlns="" val="2207354587"/>
+      </p:ext>
+    </p:extLst>
   </p:cSld>
   <p:clrMapOvr>
     <a:masterClrMapping/>
@@ -7174,9 +7939,126 @@
   <p:timing>
     <p:tnLst>
       <p:par>
-        <p:cTn id="1" dur="indefinite" restart="never" nodeType="tmRoot"/>
+        <p:cTn id="1" dur="indefinite" restart="never" nodeType="tmRoot">
+          <p:childTnLst>
+            <p:seq concurrent="1" nextAc="seek">
+              <p:cTn id="2" dur="indefinite" nodeType="mainSeq">
+                <p:childTnLst>
+                  <p:par>
+                    <p:cTn id="3" fill="hold">
+                      <p:stCondLst>
+                        <p:cond delay="indefinite"/>
+                      </p:stCondLst>
+                      <p:childTnLst>
+                        <p:par>
+                          <p:cTn id="4" fill="hold">
+                            <p:stCondLst>
+                              <p:cond delay="0"/>
+                            </p:stCondLst>
+                            <p:childTnLst>
+                              <p:par>
+                                <p:cTn id="5" presetID="2" presetClass="entr" presetSubtype="4" fill="hold" grpId="0" nodeType="clickEffect">
+                                  <p:stCondLst>
+                                    <p:cond delay="0"/>
+                                  </p:stCondLst>
+                                  <p:childTnLst>
+                                    <p:set>
+                                      <p:cBhvr>
+                                        <p:cTn id="6" dur="1" fill="hold">
+                                          <p:stCondLst>
+                                            <p:cond delay="0"/>
+                                          </p:stCondLst>
+                                        </p:cTn>
+                                        <p:tgtEl>
+                                          <p:spTgt spid="4"/>
+                                        </p:tgtEl>
+                                        <p:attrNameLst>
+                                          <p:attrName>style.visibility</p:attrName>
+                                        </p:attrNameLst>
+                                      </p:cBhvr>
+                                      <p:to>
+                                        <p:strVal val="visible"/>
+                                      </p:to>
+                                    </p:set>
+                                    <p:anim calcmode="lin" valueType="num">
+                                      <p:cBhvr additive="base">
+                                        <p:cTn id="7" dur="500" fill="hold"/>
+                                        <p:tgtEl>
+                                          <p:spTgt spid="4"/>
+                                        </p:tgtEl>
+                                        <p:attrNameLst>
+                                          <p:attrName>ppt_x</p:attrName>
+                                        </p:attrNameLst>
+                                      </p:cBhvr>
+                                      <p:tavLst>
+                                        <p:tav tm="0">
+                                          <p:val>
+                                            <p:strVal val="#ppt_x"/>
+                                          </p:val>
+                                        </p:tav>
+                                        <p:tav tm="100000">
+                                          <p:val>
+                                            <p:strVal val="#ppt_x"/>
+                                          </p:val>
+                                        </p:tav>
+                                      </p:tavLst>
+                                    </p:anim>
+                                    <p:anim calcmode="lin" valueType="num">
+                                      <p:cBhvr additive="base">
+                                        <p:cTn id="8" dur="500" fill="hold"/>
+                                        <p:tgtEl>
+                                          <p:spTgt spid="4"/>
+                                        </p:tgtEl>
+                                        <p:attrNameLst>
+                                          <p:attrName>ppt_y</p:attrName>
+                                        </p:attrNameLst>
+                                      </p:cBhvr>
+                                      <p:tavLst>
+                                        <p:tav tm="0">
+                                          <p:val>
+                                            <p:strVal val="1+#ppt_h/2"/>
+                                          </p:val>
+                                        </p:tav>
+                                        <p:tav tm="100000">
+                                          <p:val>
+                                            <p:strVal val="#ppt_y"/>
+                                          </p:val>
+                                        </p:tav>
+                                      </p:tavLst>
+                                    </p:anim>
+                                  </p:childTnLst>
+                                </p:cTn>
+                              </p:par>
+                            </p:childTnLst>
+                          </p:cTn>
+                        </p:par>
+                      </p:childTnLst>
+                    </p:cTn>
+                  </p:par>
+                </p:childTnLst>
+              </p:cTn>
+              <p:prevCondLst>
+                <p:cond evt="onPrev" delay="0">
+                  <p:tgtEl>
+                    <p:sldTgt/>
+                  </p:tgtEl>
+                </p:cond>
+              </p:prevCondLst>
+              <p:nextCondLst>
+                <p:cond evt="onNext" delay="0">
+                  <p:tgtEl>
+                    <p:sldTgt/>
+                  </p:tgtEl>
+                </p:cond>
+              </p:nextCondLst>
+            </p:seq>
+          </p:childTnLst>
+        </p:cTn>
       </p:par>
     </p:tnLst>
+    <p:bldLst>
+      <p:bldP spid="4" grpId="0" animBg="1"/>
+    </p:bldLst>
   </p:timing>
 </p:sld>
 </file>
@@ -7208,36 +8090,22 @@
             <p:ph type="title"/>
           </p:nvPr>
         </p:nvSpPr>
-        <p:spPr>
-          <a:xfrm>
-            <a:off x="301752" y="228599"/>
-            <a:ext cx="8534400" cy="963073"/>
-          </a:xfrm>
-        </p:spPr>
-        <p:txBody>
-          <a:bodyPr>
-            <a:normAutofit fontScale="90000"/>
-          </a:bodyPr>
-          <a:lstStyle/>
-          <a:p>
-            <a:r>
-              <a:rPr lang="en-US" dirty="0" smtClean="0"/>
-              <a:t>Geographic dispersion of </a:t>
-            </a:r>
-            <a:br>
-              <a:rPr lang="en-US" dirty="0" smtClean="0"/>
-            </a:br>
-            <a:r>
-              <a:rPr lang="en-US" dirty="0" smtClean="0"/>
-              <a:t>workplace fatalities and catastrophes</a:t>
-            </a:r>
-            <a:endParaRPr lang="en-US" dirty="0"/>
+        <p:spPr/>
+        <p:txBody>
+          <a:bodyPr/>
+          <a:lstStyle/>
+          <a:p>
+            <a:r>
+              <a:rPr lang="en-US" b="1" dirty="0" smtClean="0"/>
+              <a:t>Preliminary findings</a:t>
+            </a:r>
+            <a:endParaRPr lang="en-US" b="1" dirty="0"/>
           </a:p>
         </p:txBody>
       </p:sp>
       <p:pic>
         <p:nvPicPr>
-          <p:cNvPr id="4" name="Content Placeholder 3" descr="Screen Shot 2015-02-26 at 1.35.49 PM.png"/>
+          <p:cNvPr id="4" name="Content Placeholder 3" descr="+Fx2N8v8cGl0PAAAAAElFTkSuQmCC.png"/>
           <p:cNvPicPr>
             <a:picLocks noGrp="1" noChangeAspect="1"/>
           </p:cNvPicPr>
@@ -7247,13 +8115,62 @@
         </p:nvPicPr>
         <p:blipFill>
           <a:blip r:embed="rId2"/>
-          <a:srcRect l="-7880" r="-7880"/>
+          <a:srcRect l="-9914" r="-9914"/>
           <a:stretch>
             <a:fillRect/>
           </a:stretch>
         </p:blipFill>
-        <p:spPr/>
+        <p:spPr>
+          <a:xfrm>
+            <a:off x="-611150" y="1527047"/>
+            <a:ext cx="10089361" cy="5424387"/>
+          </a:xfrm>
+        </p:spPr>
       </p:pic>
+      <p:sp>
+        <p:nvSpPr>
+          <p:cNvPr id="5" name="TextBox 4"/>
+          <p:cNvSpPr txBox="1"/>
+          <p:nvPr/>
+        </p:nvSpPr>
+        <p:spPr>
+          <a:xfrm>
+            <a:off x="4833604" y="3071036"/>
+            <a:ext cx="4002548" cy="1015663"/>
+          </a:xfrm>
+          <a:prstGeom prst="rect">
+            <a:avLst/>
+          </a:prstGeom>
+          <a:solidFill>
+            <a:schemeClr val="bg1">
+              <a:alpha val="85000"/>
+            </a:schemeClr>
+          </a:solidFill>
+          <a:effectLst>
+            <a:outerShdw blurRad="50800" dist="38100" dir="2700000" algn="tl" rotWithShape="0">
+              <a:srgbClr val="000000">
+                <a:alpha val="43000"/>
+              </a:srgbClr>
+            </a:outerShdw>
+          </a:effectLst>
+        </p:spPr>
+        <p:txBody>
+          <a:bodyPr wrap="square" rtlCol="0">
+            <a:spAutoFit/>
+          </a:bodyPr>
+          <a:lstStyle/>
+          <a:p>
+            <a:pPr>
+              <a:buFont typeface="Symbol" charset="2"/>
+              <a:buChar char=""/>
+            </a:pPr>
+            <a:r>
+              <a:rPr lang="en-US" sz="2000" dirty="0" smtClean="0"/>
+              <a:t>From 1990-2010: northward shift in fatalities across Mason-Dixon line?</a:t>
+            </a:r>
+          </a:p>
+        </p:txBody>
+      </p:sp>
     </p:spTree>
   </p:cSld>
   <p:clrMapOvr>
@@ -7262,9 +8179,126 @@
   <p:timing>
     <p:tnLst>
       <p:par>
-        <p:cTn id="1" dur="indefinite" restart="never" nodeType="tmRoot"/>
+        <p:cTn id="1" dur="indefinite" restart="never" nodeType="tmRoot">
+          <p:childTnLst>
+            <p:seq concurrent="1" nextAc="seek">
+              <p:cTn id="2" dur="indefinite" nodeType="mainSeq">
+                <p:childTnLst>
+                  <p:par>
+                    <p:cTn id="3" fill="hold">
+                      <p:stCondLst>
+                        <p:cond delay="indefinite"/>
+                      </p:stCondLst>
+                      <p:childTnLst>
+                        <p:par>
+                          <p:cTn id="4" fill="hold">
+                            <p:stCondLst>
+                              <p:cond delay="0"/>
+                            </p:stCondLst>
+                            <p:childTnLst>
+                              <p:par>
+                                <p:cTn id="5" presetID="2" presetClass="entr" presetSubtype="4" fill="hold" grpId="0" nodeType="clickEffect">
+                                  <p:stCondLst>
+                                    <p:cond delay="0"/>
+                                  </p:stCondLst>
+                                  <p:childTnLst>
+                                    <p:set>
+                                      <p:cBhvr>
+                                        <p:cTn id="6" dur="1" fill="hold">
+                                          <p:stCondLst>
+                                            <p:cond delay="0"/>
+                                          </p:stCondLst>
+                                        </p:cTn>
+                                        <p:tgtEl>
+                                          <p:spTgt spid="5"/>
+                                        </p:tgtEl>
+                                        <p:attrNameLst>
+                                          <p:attrName>style.visibility</p:attrName>
+                                        </p:attrNameLst>
+                                      </p:cBhvr>
+                                      <p:to>
+                                        <p:strVal val="visible"/>
+                                      </p:to>
+                                    </p:set>
+                                    <p:anim calcmode="lin" valueType="num">
+                                      <p:cBhvr additive="base">
+                                        <p:cTn id="7" dur="500" fill="hold"/>
+                                        <p:tgtEl>
+                                          <p:spTgt spid="5"/>
+                                        </p:tgtEl>
+                                        <p:attrNameLst>
+                                          <p:attrName>ppt_x</p:attrName>
+                                        </p:attrNameLst>
+                                      </p:cBhvr>
+                                      <p:tavLst>
+                                        <p:tav tm="0">
+                                          <p:val>
+                                            <p:strVal val="#ppt_x"/>
+                                          </p:val>
+                                        </p:tav>
+                                        <p:tav tm="100000">
+                                          <p:val>
+                                            <p:strVal val="#ppt_x"/>
+                                          </p:val>
+                                        </p:tav>
+                                      </p:tavLst>
+                                    </p:anim>
+                                    <p:anim calcmode="lin" valueType="num">
+                                      <p:cBhvr additive="base">
+                                        <p:cTn id="8" dur="500" fill="hold"/>
+                                        <p:tgtEl>
+                                          <p:spTgt spid="5"/>
+                                        </p:tgtEl>
+                                        <p:attrNameLst>
+                                          <p:attrName>ppt_y</p:attrName>
+                                        </p:attrNameLst>
+                                      </p:cBhvr>
+                                      <p:tavLst>
+                                        <p:tav tm="0">
+                                          <p:val>
+                                            <p:strVal val="1+#ppt_h/2"/>
+                                          </p:val>
+                                        </p:tav>
+                                        <p:tav tm="100000">
+                                          <p:val>
+                                            <p:strVal val="#ppt_y"/>
+                                          </p:val>
+                                        </p:tav>
+                                      </p:tavLst>
+                                    </p:anim>
+                                  </p:childTnLst>
+                                </p:cTn>
+                              </p:par>
+                            </p:childTnLst>
+                          </p:cTn>
+                        </p:par>
+                      </p:childTnLst>
+                    </p:cTn>
+                  </p:par>
+                </p:childTnLst>
+              </p:cTn>
+              <p:prevCondLst>
+                <p:cond evt="onPrev" delay="0">
+                  <p:tgtEl>
+                    <p:sldTgt/>
+                  </p:tgtEl>
+                </p:cond>
+              </p:prevCondLst>
+              <p:nextCondLst>
+                <p:cond evt="onNext" delay="0">
+                  <p:tgtEl>
+                    <p:sldTgt/>
+                  </p:tgtEl>
+                </p:cond>
+              </p:nextCondLst>
+            </p:seq>
+          </p:childTnLst>
+        </p:cTn>
       </p:par>
     </p:tnLst>
+    <p:bldLst>
+      <p:bldP spid="5" grpId="0" animBg="1"/>
+    </p:bldLst>
   </p:timing>
 </p:sld>
 </file>
@@ -7309,23 +8343,23 @@
           <a:lstStyle/>
           <a:p>
             <a:r>
-              <a:rPr lang="en-US" dirty="0" smtClean="0"/>
+              <a:rPr lang="en-US" b="1" dirty="0" smtClean="0"/>
               <a:t>Geographic dispersion of </a:t>
             </a:r>
             <a:br>
-              <a:rPr lang="en-US" dirty="0" smtClean="0"/>
+              <a:rPr lang="en-US" b="1" dirty="0" smtClean="0"/>
             </a:br>
             <a:r>
-              <a:rPr lang="en-US" dirty="0" smtClean="0"/>
+              <a:rPr lang="en-US" b="1" dirty="0" smtClean="0"/>
               <a:t>workplace fatalities and catastrophes</a:t>
             </a:r>
-            <a:endParaRPr lang="en-US" dirty="0"/>
+            <a:endParaRPr lang="en-US" b="1" dirty="0"/>
           </a:p>
         </p:txBody>
       </p:sp>
       <p:pic>
         <p:nvPicPr>
-          <p:cNvPr id="6" name="Content Placeholder 5" descr="Screen Shot 2015-02-26 at 1.38.31 PM.png"/>
+          <p:cNvPr id="4" name="Content Placeholder 3" descr="Screen Shot 2015-02-26 at 1.35.49 PM.png"/>
           <p:cNvPicPr>
             <a:picLocks noGrp="1" noChangeAspect="1"/>
           </p:cNvPicPr>
@@ -7335,13 +8369,67 @@
         </p:nvPicPr>
         <p:blipFill>
           <a:blip r:embed="rId2"/>
-          <a:srcRect l="-7543" r="-7543"/>
+          <a:srcRect l="-7880" r="-7880"/>
           <a:stretch>
             <a:fillRect/>
           </a:stretch>
         </p:blipFill>
         <p:spPr/>
       </p:pic>
+      <p:sp>
+        <p:nvSpPr>
+          <p:cNvPr id="5" name="TextBox 4"/>
+          <p:cNvSpPr txBox="1"/>
+          <p:nvPr/>
+        </p:nvSpPr>
+        <p:spPr>
+          <a:xfrm>
+            <a:off x="4833604" y="3071036"/>
+            <a:ext cx="4002548" cy="1631216"/>
+          </a:xfrm>
+          <a:prstGeom prst="rect">
+            <a:avLst/>
+          </a:prstGeom>
+          <a:solidFill>
+            <a:schemeClr val="bg1">
+              <a:alpha val="85000"/>
+            </a:schemeClr>
+          </a:solidFill>
+          <a:effectLst>
+            <a:outerShdw blurRad="50800" dist="38100" dir="2700000" algn="tl" rotWithShape="0">
+              <a:srgbClr val="000000">
+                <a:alpha val="43000"/>
+              </a:srgbClr>
+            </a:outerShdw>
+          </a:effectLst>
+        </p:spPr>
+        <p:txBody>
+          <a:bodyPr wrap="square" rtlCol="0">
+            <a:spAutoFit/>
+          </a:bodyPr>
+          <a:lstStyle/>
+          <a:p>
+            <a:pPr>
+              <a:buFont typeface="Symbol" charset="2"/>
+              <a:buChar char=""/>
+            </a:pPr>
+            <a:r>
+              <a:rPr lang="en-US" sz="2000" dirty="0" smtClean="0"/>
+              <a:t>There are several outliers: California, Texas, Oregon, Florida, Maryland.</a:t>
+            </a:r>
+          </a:p>
+          <a:p>
+            <a:pPr>
+              <a:buFont typeface="Symbol" charset="2"/>
+              <a:buChar char=""/>
+            </a:pPr>
+            <a:r>
+              <a:rPr lang="en-US" sz="2000" dirty="0" smtClean="0"/>
+              <a:t>Is this due to population size, or something else?</a:t>
+            </a:r>
+          </a:p>
+        </p:txBody>
+      </p:sp>
     </p:spTree>
   </p:cSld>
   <p:clrMapOvr>
@@ -7350,9 +8438,126 @@
   <p:timing>
     <p:tnLst>
       <p:par>
-        <p:cTn id="1" dur="indefinite" restart="never" nodeType="tmRoot"/>
+        <p:cTn id="1" dur="indefinite" restart="never" nodeType="tmRoot">
+          <p:childTnLst>
+            <p:seq concurrent="1" nextAc="seek">
+              <p:cTn id="2" dur="indefinite" nodeType="mainSeq">
+                <p:childTnLst>
+                  <p:par>
+                    <p:cTn id="3" fill="hold">
+                      <p:stCondLst>
+                        <p:cond delay="indefinite"/>
+                      </p:stCondLst>
+                      <p:childTnLst>
+                        <p:par>
+                          <p:cTn id="4" fill="hold">
+                            <p:stCondLst>
+                              <p:cond delay="0"/>
+                            </p:stCondLst>
+                            <p:childTnLst>
+                              <p:par>
+                                <p:cTn id="5" presetID="2" presetClass="entr" presetSubtype="4" fill="hold" grpId="0" nodeType="clickEffect">
+                                  <p:stCondLst>
+                                    <p:cond delay="0"/>
+                                  </p:stCondLst>
+                                  <p:childTnLst>
+                                    <p:set>
+                                      <p:cBhvr>
+                                        <p:cTn id="6" dur="1" fill="hold">
+                                          <p:stCondLst>
+                                            <p:cond delay="0"/>
+                                          </p:stCondLst>
+                                        </p:cTn>
+                                        <p:tgtEl>
+                                          <p:spTgt spid="5"/>
+                                        </p:tgtEl>
+                                        <p:attrNameLst>
+                                          <p:attrName>style.visibility</p:attrName>
+                                        </p:attrNameLst>
+                                      </p:cBhvr>
+                                      <p:to>
+                                        <p:strVal val="visible"/>
+                                      </p:to>
+                                    </p:set>
+                                    <p:anim calcmode="lin" valueType="num">
+                                      <p:cBhvr additive="base">
+                                        <p:cTn id="7" dur="500" fill="hold"/>
+                                        <p:tgtEl>
+                                          <p:spTgt spid="5"/>
+                                        </p:tgtEl>
+                                        <p:attrNameLst>
+                                          <p:attrName>ppt_x</p:attrName>
+                                        </p:attrNameLst>
+                                      </p:cBhvr>
+                                      <p:tavLst>
+                                        <p:tav tm="0">
+                                          <p:val>
+                                            <p:strVal val="#ppt_x"/>
+                                          </p:val>
+                                        </p:tav>
+                                        <p:tav tm="100000">
+                                          <p:val>
+                                            <p:strVal val="#ppt_x"/>
+                                          </p:val>
+                                        </p:tav>
+                                      </p:tavLst>
+                                    </p:anim>
+                                    <p:anim calcmode="lin" valueType="num">
+                                      <p:cBhvr additive="base">
+                                        <p:cTn id="8" dur="500" fill="hold"/>
+                                        <p:tgtEl>
+                                          <p:spTgt spid="5"/>
+                                        </p:tgtEl>
+                                        <p:attrNameLst>
+                                          <p:attrName>ppt_y</p:attrName>
+                                        </p:attrNameLst>
+                                      </p:cBhvr>
+                                      <p:tavLst>
+                                        <p:tav tm="0">
+                                          <p:val>
+                                            <p:strVal val="1+#ppt_h/2"/>
+                                          </p:val>
+                                        </p:tav>
+                                        <p:tav tm="100000">
+                                          <p:val>
+                                            <p:strVal val="#ppt_y"/>
+                                          </p:val>
+                                        </p:tav>
+                                      </p:tavLst>
+                                    </p:anim>
+                                  </p:childTnLst>
+                                </p:cTn>
+                              </p:par>
+                            </p:childTnLst>
+                          </p:cTn>
+                        </p:par>
+                      </p:childTnLst>
+                    </p:cTn>
+                  </p:par>
+                </p:childTnLst>
+              </p:cTn>
+              <p:prevCondLst>
+                <p:cond evt="onPrev" delay="0">
+                  <p:tgtEl>
+                    <p:sldTgt/>
+                  </p:tgtEl>
+                </p:cond>
+              </p:prevCondLst>
+              <p:nextCondLst>
+                <p:cond evt="onNext" delay="0">
+                  <p:tgtEl>
+                    <p:sldTgt/>
+                  </p:tgtEl>
+                </p:cond>
+              </p:nextCondLst>
+            </p:seq>
+          </p:childTnLst>
+        </p:cTn>
       </p:par>
     </p:tnLst>
+    <p:bldLst>
+      <p:bldP spid="5" grpId="0" animBg="1"/>
+    </p:bldLst>
   </p:timing>
 </p:sld>
 </file>

</xml_diff>